<commit_message>
Minor path fix for module.
</commit_message>
<xml_diff>
--- a/presentation/JZ_PGConf2019.pptx
+++ b/presentation/JZ_PGConf2019.pptx
@@ -8,6 +8,7 @@
     <p:sldId id="256" r:id="rId2"/>
     <p:sldId id="257" r:id="rId3"/>
     <p:sldId id="258" r:id="rId4"/>
+    <p:sldId id="259" r:id="rId5"/>
   </p:sldIdLst>
   <p:sldSz cx="12192000" cy="6858000"/>
   <p:notesSz cx="6858000" cy="9144000"/>
@@ -106,6 +107,11 @@
       </a:defRPr>
     </a:lvl9pPr>
   </p:defaultTextStyle>
+  <p:extLst>
+    <p:ext uri="{EFAFB233-063F-42B5-8137-9DF3F51BA10A}">
+      <p15:sldGuideLst xmlns:p15="http://schemas.microsoft.com/office/powerpoint/2012/main"/>
+    </p:ext>
+  </p:extLst>
 </p:presentation>
 </file>
 
@@ -295,7 +301,7 @@
           <a:p>
             <a:fld id="{4AAD347D-5ACD-4C99-B74B-A9C85AD731AF}" type="datetimeFigureOut">
               <a:rPr lang="en-US" dirty="0"/>
-              <a:t>3/14/19</a:t>
+              <a:t>3/16/19</a:t>
             </a:fld>
             <a:endParaRPr lang="en-US" dirty="0"/>
           </a:p>
@@ -565,7 +571,7 @@
           <a:p>
             <a:fld id="{4509A250-FF31-4206-8172-F9D3106AACB1}" type="datetimeFigureOut">
               <a:rPr lang="en-US" dirty="0"/>
-              <a:t>3/14/19</a:t>
+              <a:t>3/16/19</a:t>
             </a:fld>
             <a:endParaRPr lang="en-US" dirty="0"/>
           </a:p>
@@ -754,7 +760,7 @@
           <a:p>
             <a:fld id="{4509A250-FF31-4206-8172-F9D3106AACB1}" type="datetimeFigureOut">
               <a:rPr lang="en-US" dirty="0"/>
-              <a:t>3/14/19</a:t>
+              <a:t>3/16/19</a:t>
             </a:fld>
             <a:endParaRPr lang="en-US" dirty="0"/>
           </a:p>
@@ -1022,7 +1028,7 @@
           <a:p>
             <a:fld id="{4509A250-FF31-4206-8172-F9D3106AACB1}" type="datetimeFigureOut">
               <a:rPr lang="en-US" dirty="0"/>
-              <a:t>3/14/19</a:t>
+              <a:t>3/16/19</a:t>
             </a:fld>
             <a:endParaRPr lang="en-US" dirty="0"/>
           </a:p>
@@ -1358,7 +1364,7 @@
           <a:p>
             <a:fld id="{4509A250-FF31-4206-8172-F9D3106AACB1}" type="datetimeFigureOut">
               <a:rPr lang="en-US" dirty="0"/>
-              <a:t>3/14/19</a:t>
+              <a:t>3/16/19</a:t>
             </a:fld>
             <a:endParaRPr lang="en-US" dirty="0"/>
           </a:p>
@@ -1976,7 +1982,7 @@
           <a:p>
             <a:fld id="{4509A250-FF31-4206-8172-F9D3106AACB1}" type="datetimeFigureOut">
               <a:rPr lang="en-US" dirty="0"/>
-              <a:t>3/14/19</a:t>
+              <a:t>3/16/19</a:t>
             </a:fld>
             <a:endParaRPr lang="en-US" dirty="0"/>
           </a:p>
@@ -2831,7 +2837,7 @@
           <a:p>
             <a:fld id="{4509A250-FF31-4206-8172-F9D3106AACB1}" type="datetimeFigureOut">
               <a:rPr lang="en-US" dirty="0"/>
-              <a:t>3/14/19</a:t>
+              <a:t>3/16/19</a:t>
             </a:fld>
             <a:endParaRPr lang="en-US" dirty="0"/>
           </a:p>
@@ -2996,7 +3002,7 @@
           <a:p>
             <a:fld id="{4509A250-FF31-4206-8172-F9D3106AACB1}" type="datetimeFigureOut">
               <a:rPr lang="en-US" dirty="0"/>
-              <a:t>3/14/19</a:t>
+              <a:t>3/16/19</a:t>
             </a:fld>
             <a:endParaRPr lang="en-US" dirty="0"/>
           </a:p>
@@ -3171,7 +3177,7 @@
           <a:p>
             <a:fld id="{4509A250-FF31-4206-8172-F9D3106AACB1}" type="datetimeFigureOut">
               <a:rPr lang="en-US" dirty="0"/>
-              <a:t>3/14/19</a:t>
+              <a:t>3/16/19</a:t>
             </a:fld>
             <a:endParaRPr lang="en-US" dirty="0"/>
           </a:p>
@@ -3336,7 +3342,7 @@
           <a:p>
             <a:fld id="{4509A250-FF31-4206-8172-F9D3106AACB1}" type="datetimeFigureOut">
               <a:rPr lang="en-US" dirty="0"/>
-              <a:t>3/14/19</a:t>
+              <a:t>3/16/19</a:t>
             </a:fld>
             <a:endParaRPr lang="en-US" dirty="0"/>
           </a:p>
@@ -3578,7 +3584,7 @@
           <a:p>
             <a:fld id="{9796027F-7875-4030-9381-8BD8C4F21935}" type="datetimeFigureOut">
               <a:rPr lang="en-US" dirty="0"/>
-              <a:t>3/14/19</a:t>
+              <a:t>3/16/19</a:t>
             </a:fld>
             <a:endParaRPr lang="en-US" dirty="0"/>
           </a:p>
@@ -3865,7 +3871,7 @@
           <a:p>
             <a:fld id="{9796027F-7875-4030-9381-8BD8C4F21935}" type="datetimeFigureOut">
               <a:rPr lang="en-US" dirty="0"/>
-              <a:t>3/14/19</a:t>
+              <a:t>3/16/19</a:t>
             </a:fld>
             <a:endParaRPr lang="en-US" dirty="0"/>
           </a:p>
@@ -4304,7 +4310,7 @@
           <a:p>
             <a:fld id="{9796027F-7875-4030-9381-8BD8C4F21935}" type="datetimeFigureOut">
               <a:rPr lang="en-US" dirty="0"/>
-              <a:t>3/14/19</a:t>
+              <a:t>3/16/19</a:t>
             </a:fld>
             <a:endParaRPr lang="en-US" dirty="0"/>
           </a:p>
@@ -4417,7 +4423,7 @@
           <a:p>
             <a:fld id="{4509A250-FF31-4206-8172-F9D3106AACB1}" type="datetimeFigureOut">
               <a:rPr lang="en-US" dirty="0"/>
-              <a:t>3/14/19</a:t>
+              <a:t>3/16/19</a:t>
             </a:fld>
             <a:endParaRPr lang="en-US" dirty="0"/>
           </a:p>
@@ -4507,7 +4513,7 @@
           <a:p>
             <a:fld id="{4509A250-FF31-4206-8172-F9D3106AACB1}" type="datetimeFigureOut">
               <a:rPr lang="en-US" dirty="0"/>
-              <a:t>3/14/19</a:t>
+              <a:t>3/16/19</a:t>
             </a:fld>
             <a:endParaRPr lang="en-US" dirty="0"/>
           </a:p>
@@ -4781,7 +4787,7 @@
           <a:p>
             <a:fld id="{4509A250-FF31-4206-8172-F9D3106AACB1}" type="datetimeFigureOut">
               <a:rPr lang="en-US" dirty="0"/>
-              <a:t>3/14/19</a:t>
+              <a:t>3/16/19</a:t>
             </a:fld>
             <a:endParaRPr lang="en-US" dirty="0"/>
           </a:p>
@@ -5051,7 +5057,7 @@
           <a:p>
             <a:fld id="{4509A250-FF31-4206-8172-F9D3106AACB1}" type="datetimeFigureOut">
               <a:rPr lang="en-US" dirty="0"/>
-              <a:t>3/14/19</a:t>
+              <a:t>3/16/19</a:t>
             </a:fld>
             <a:endParaRPr lang="en-US" dirty="0"/>
           </a:p>
@@ -5475,7 +5481,7 @@
           <a:p>
             <a:fld id="{4AAD347D-5ACD-4C99-B74B-A9C85AD731AF}" type="datetimeFigureOut">
               <a:rPr lang="en-US" dirty="0"/>
-              <a:t>3/14/19</a:t>
+              <a:t>3/16/19</a:t>
             </a:fld>
             <a:endParaRPr lang="en-US" dirty="0"/>
           </a:p>
@@ -6348,6 +6354,110 @@
 </p:sld>
 </file>
 
+<file path=ppt/slides/slide4.xml><?xml version="1.0" encoding="utf-8"?>
+<p:sld xmlns:a="http://schemas.openxmlformats.org/drawingml/2006/main" xmlns:r="http://schemas.openxmlformats.org/officeDocument/2006/relationships" xmlns:p="http://schemas.openxmlformats.org/presentationml/2006/main">
+  <p:cSld>
+    <p:spTree>
+      <p:nvGrpSpPr>
+        <p:cNvPr id="1" name=""/>
+        <p:cNvGrpSpPr/>
+        <p:nvPr/>
+      </p:nvGrpSpPr>
+      <p:grpSpPr>
+        <a:xfrm>
+          <a:off x="0" y="0"/>
+          <a:ext cx="0" cy="0"/>
+          <a:chOff x="0" y="0"/>
+          <a:chExt cx="0" cy="0"/>
+        </a:xfrm>
+      </p:grpSpPr>
+      <p:sp>
+        <p:nvSpPr>
+          <p:cNvPr id="2" name="Title 1">
+            <a:extLst>
+              <a:ext uri="{FF2B5EF4-FFF2-40B4-BE49-F238E27FC236}">
+                <a16:creationId xmlns:a16="http://schemas.microsoft.com/office/drawing/2014/main" id="{9E80A2ED-14A3-3E40-A118-B4431CFB82FD}"/>
+              </a:ext>
+            </a:extLst>
+          </p:cNvPr>
+          <p:cNvSpPr>
+            <a:spLocks noGrp="1"/>
+          </p:cNvSpPr>
+          <p:nvPr>
+            <p:ph type="title"/>
+          </p:nvPr>
+        </p:nvSpPr>
+        <p:spPr/>
+        <p:txBody>
+          <a:bodyPr/>
+          <a:lstStyle/>
+          <a:p>
+            <a:r>
+              <a:rPr lang="en-US" dirty="0"/>
+              <a:t>System Engineering	</a:t>
+            </a:r>
+          </a:p>
+        </p:txBody>
+      </p:sp>
+      <p:sp>
+        <p:nvSpPr>
+          <p:cNvPr id="3" name="Content Placeholder 2">
+            <a:extLst>
+              <a:ext uri="{FF2B5EF4-FFF2-40B4-BE49-F238E27FC236}">
+                <a16:creationId xmlns:a16="http://schemas.microsoft.com/office/drawing/2014/main" id="{BEA36803-36FA-004B-BBCA-2DC49F69EC5D}"/>
+              </a:ext>
+            </a:extLst>
+          </p:cNvPr>
+          <p:cNvSpPr>
+            <a:spLocks noGrp="1"/>
+          </p:cNvSpPr>
+          <p:nvPr>
+            <p:ph idx="1"/>
+          </p:nvPr>
+        </p:nvSpPr>
+        <p:spPr/>
+        <p:txBody>
+          <a:bodyPr/>
+          <a:lstStyle/>
+          <a:p>
+            <a:r>
+              <a:rPr lang="en-US" dirty="0"/>
+              <a:t>When is persistent storage not actually persistent?</a:t>
+            </a:r>
+          </a:p>
+          <a:p>
+            <a:pPr lvl="1"/>
+            <a:r>
+              <a:rPr lang="en-US" dirty="0"/>
+              <a:t>When its an AWS Instance Store.</a:t>
+            </a:r>
+          </a:p>
+          <a:p>
+            <a:pPr lvl="1"/>
+            <a:r>
+              <a:rPr lang="en-US" dirty="0"/>
+              <a:t>When its an Azure “Temporary” Disk</a:t>
+            </a:r>
+            <a:r>
+              <a:rPr lang="en-US"/>
+              <a:t>/Cache</a:t>
+            </a:r>
+          </a:p>
+        </p:txBody>
+      </p:sp>
+    </p:spTree>
+    <p:extLst>
+      <p:ext uri="{BB962C8B-B14F-4D97-AF65-F5344CB8AC3E}">
+        <p14:creationId xmlns:p14="http://schemas.microsoft.com/office/powerpoint/2010/main" val="377590014"/>
+      </p:ext>
+    </p:extLst>
+  </p:cSld>
+  <p:clrMapOvr>
+    <a:masterClrMapping/>
+  </p:clrMapOvr>
+</p:sld>
+</file>
+
 <file path=ppt/theme/theme1.xml><?xml version="1.0" encoding="utf-8"?>
 <a:theme xmlns:a="http://schemas.openxmlformats.org/drawingml/2006/main" name="Ion">
   <a:themeElements>

</xml_diff>

<commit_message>
Update costing charts and make up slides - draft 1
</commit_message>
<xml_diff>
--- a/presentation/JZ_PGConf2019.pptx
+++ b/presentation/JZ_PGConf2019.pptx
@@ -5,7 +5,7 @@
     <p:sldMasterId id="2147483648" r:id="rId1"/>
   </p:sldMasterIdLst>
   <p:notesMasterIdLst>
-    <p:notesMasterId r:id="rId23"/>
+    <p:notesMasterId r:id="rId28"/>
   </p:notesMasterIdLst>
   <p:sldIdLst>
     <p:sldId id="256" r:id="rId2"/>
@@ -24,11 +24,16 @@
     <p:sldId id="274" r:id="rId15"/>
     <p:sldId id="275" r:id="rId16"/>
     <p:sldId id="276" r:id="rId17"/>
-    <p:sldId id="269" r:id="rId18"/>
-    <p:sldId id="271" r:id="rId19"/>
-    <p:sldId id="263" r:id="rId20"/>
-    <p:sldId id="262" r:id="rId21"/>
-    <p:sldId id="258" r:id="rId22"/>
+    <p:sldId id="277" r:id="rId18"/>
+    <p:sldId id="279" r:id="rId19"/>
+    <p:sldId id="278" r:id="rId20"/>
+    <p:sldId id="280" r:id="rId21"/>
+    <p:sldId id="269" r:id="rId22"/>
+    <p:sldId id="271" r:id="rId23"/>
+    <p:sldId id="281" r:id="rId24"/>
+    <p:sldId id="263" r:id="rId25"/>
+    <p:sldId id="262" r:id="rId26"/>
+    <p:sldId id="258" r:id="rId27"/>
   </p:sldIdLst>
   <p:sldSz cx="12192000" cy="6858000"/>
   <p:notesSz cx="6858000" cy="9144000"/>
@@ -1169,6 +1174,194 @@
     <p:extLst>
       <p:ext uri="{BB962C8B-B14F-4D97-AF65-F5344CB8AC3E}">
         <p14:creationId xmlns:p14="http://schemas.microsoft.com/office/powerpoint/2010/main" val="3676610444"/>
+      </p:ext>
+    </p:extLst>
+  </p:cSld>
+  <p:clrMapOvr>
+    <a:masterClrMapping/>
+  </p:clrMapOvr>
+</p:notes>
+</file>
+
+<file path=ppt/notesSlides/notesSlide7.xml><?xml version="1.0" encoding="utf-8"?>
+<p:notes xmlns:a="http://schemas.openxmlformats.org/drawingml/2006/main" xmlns:r="http://schemas.openxmlformats.org/officeDocument/2006/relationships" xmlns:p="http://schemas.openxmlformats.org/presentationml/2006/main">
+  <p:cSld>
+    <p:spTree>
+      <p:nvGrpSpPr>
+        <p:cNvPr id="1" name=""/>
+        <p:cNvGrpSpPr/>
+        <p:nvPr/>
+      </p:nvGrpSpPr>
+      <p:grpSpPr>
+        <a:xfrm>
+          <a:off x="0" y="0"/>
+          <a:ext cx="0" cy="0"/>
+          <a:chOff x="0" y="0"/>
+          <a:chExt cx="0" cy="0"/>
+        </a:xfrm>
+      </p:grpSpPr>
+      <p:sp>
+        <p:nvSpPr>
+          <p:cNvPr id="2" name="Slide Image Placeholder 1"/>
+          <p:cNvSpPr>
+            <a:spLocks noGrp="1" noRot="1" noChangeAspect="1"/>
+          </p:cNvSpPr>
+          <p:nvPr>
+            <p:ph type="sldImg"/>
+          </p:nvPr>
+        </p:nvSpPr>
+        <p:spPr/>
+      </p:sp>
+      <p:sp>
+        <p:nvSpPr>
+          <p:cNvPr id="3" name="Notes Placeholder 2"/>
+          <p:cNvSpPr>
+            <a:spLocks noGrp="1"/>
+          </p:cNvSpPr>
+          <p:nvPr>
+            <p:ph type="body" idx="1"/>
+          </p:nvPr>
+        </p:nvSpPr>
+        <p:spPr/>
+        <p:txBody>
+          <a:bodyPr/>
+          <a:lstStyle/>
+          <a:p>
+            <a:r>
+              <a:rPr lang="en-US" dirty="0"/>
+              <a:t>Want the red bars to be larger than blue -&gt; Highly cost efficient.</a:t>
+            </a:r>
+          </a:p>
+          <a:p>
+            <a:r>
+              <a:rPr lang="en-US" dirty="0"/>
+              <a:t>When the bars start to pass each other, that’s the inflection point. You are throwing money away.</a:t>
+            </a:r>
+          </a:p>
+        </p:txBody>
+      </p:sp>
+      <p:sp>
+        <p:nvSpPr>
+          <p:cNvPr id="4" name="Slide Number Placeholder 3"/>
+          <p:cNvSpPr>
+            <a:spLocks noGrp="1"/>
+          </p:cNvSpPr>
+          <p:nvPr>
+            <p:ph type="sldNum" sz="quarter" idx="5"/>
+          </p:nvPr>
+        </p:nvSpPr>
+        <p:spPr/>
+        <p:txBody>
+          <a:bodyPr/>
+          <a:lstStyle/>
+          <a:p>
+            <a:fld id="{BAFC506A-74C4-0742-8747-64C8614D5F29}" type="slidenum">
+              <a:rPr lang="en-US" smtClean="0"/>
+              <a:t>18</a:t>
+            </a:fld>
+            <a:endParaRPr lang="en-US"/>
+          </a:p>
+        </p:txBody>
+      </p:sp>
+    </p:spTree>
+    <p:extLst>
+      <p:ext uri="{BB962C8B-B14F-4D97-AF65-F5344CB8AC3E}">
+        <p14:creationId xmlns:p14="http://schemas.microsoft.com/office/powerpoint/2010/main" val="3976976846"/>
+      </p:ext>
+    </p:extLst>
+  </p:cSld>
+  <p:clrMapOvr>
+    <a:masterClrMapping/>
+  </p:clrMapOvr>
+</p:notes>
+</file>
+
+<file path=ppt/notesSlides/notesSlide8.xml><?xml version="1.0" encoding="utf-8"?>
+<p:notes xmlns:a="http://schemas.openxmlformats.org/drawingml/2006/main" xmlns:r="http://schemas.openxmlformats.org/officeDocument/2006/relationships" xmlns:p="http://schemas.openxmlformats.org/presentationml/2006/main">
+  <p:cSld>
+    <p:spTree>
+      <p:nvGrpSpPr>
+        <p:cNvPr id="1" name=""/>
+        <p:cNvGrpSpPr/>
+        <p:nvPr/>
+      </p:nvGrpSpPr>
+      <p:grpSpPr>
+        <a:xfrm>
+          <a:off x="0" y="0"/>
+          <a:ext cx="0" cy="0"/>
+          <a:chOff x="0" y="0"/>
+          <a:chExt cx="0" cy="0"/>
+        </a:xfrm>
+      </p:grpSpPr>
+      <p:sp>
+        <p:nvSpPr>
+          <p:cNvPr id="2" name="Slide Image Placeholder 1"/>
+          <p:cNvSpPr>
+            <a:spLocks noGrp="1" noRot="1" noChangeAspect="1"/>
+          </p:cNvSpPr>
+          <p:nvPr>
+            <p:ph type="sldImg"/>
+          </p:nvPr>
+        </p:nvSpPr>
+        <p:spPr/>
+      </p:sp>
+      <p:sp>
+        <p:nvSpPr>
+          <p:cNvPr id="3" name="Notes Placeholder 2"/>
+          <p:cNvSpPr>
+            <a:spLocks noGrp="1"/>
+          </p:cNvSpPr>
+          <p:nvPr>
+            <p:ph type="body" idx="1"/>
+          </p:nvPr>
+        </p:nvSpPr>
+        <p:spPr/>
+        <p:txBody>
+          <a:bodyPr/>
+          <a:lstStyle/>
+          <a:p>
+            <a:r>
+              <a:rPr lang="en-US" dirty="0"/>
+              <a:t>What would a Raspberry PI do? </a:t>
+            </a:r>
+            <a:r>
+              <a:rPr lang="en-US" dirty="0" err="1"/>
+              <a:t>Tegra</a:t>
+            </a:r>
+            <a:r>
+              <a:rPr lang="en-US" dirty="0"/>
+              <a:t>? Marvel ARMADA?</a:t>
+            </a:r>
+          </a:p>
+        </p:txBody>
+      </p:sp>
+      <p:sp>
+        <p:nvSpPr>
+          <p:cNvPr id="4" name="Slide Number Placeholder 3"/>
+          <p:cNvSpPr>
+            <a:spLocks noGrp="1"/>
+          </p:cNvSpPr>
+          <p:nvPr>
+            <p:ph type="sldNum" sz="quarter" idx="5"/>
+          </p:nvPr>
+        </p:nvSpPr>
+        <p:spPr/>
+        <p:txBody>
+          <a:bodyPr/>
+          <a:lstStyle/>
+          <a:p>
+            <a:fld id="{BAFC506A-74C4-0742-8747-64C8614D5F29}" type="slidenum">
+              <a:rPr lang="en-US" smtClean="0"/>
+              <a:t>20</a:t>
+            </a:fld>
+            <a:endParaRPr lang="en-US"/>
+          </a:p>
+        </p:txBody>
+      </p:sp>
+    </p:spTree>
+    <p:extLst>
+      <p:ext uri="{BB962C8B-B14F-4D97-AF65-F5344CB8AC3E}">
+        <p14:creationId xmlns:p14="http://schemas.microsoft.com/office/powerpoint/2010/main" val="337933521"/>
       </p:ext>
     </p:extLst>
   </p:cSld>
@@ -8665,31 +8858,35 @@
           </a:p>
         </p:txBody>
       </p:sp>
-      <p:sp>
-        <p:nvSpPr>
-          <p:cNvPr id="3" name="Content Placeholder 2">
+      <p:pic>
+        <p:nvPicPr>
+          <p:cNvPr id="8" name="Content Placeholder 7">
             <a:extLst>
               <a:ext uri="{FF2B5EF4-FFF2-40B4-BE49-F238E27FC236}">
-                <a16:creationId xmlns:a16="http://schemas.microsoft.com/office/drawing/2014/main" id="{503647EE-C992-8D4B-A714-FAE6BD50A3FD}"/>
+                <a16:creationId xmlns:a16="http://schemas.microsoft.com/office/drawing/2014/main" id="{016EDB0A-0A3D-544B-A853-8CA91813B225}"/>
               </a:ext>
             </a:extLst>
           </p:cNvPr>
-          <p:cNvSpPr>
-            <a:spLocks noGrp="1"/>
-          </p:cNvSpPr>
+          <p:cNvPicPr>
+            <a:picLocks noGrp="1" noChangeAspect="1"/>
+          </p:cNvPicPr>
           <p:nvPr>
             <p:ph idx="1"/>
           </p:nvPr>
-        </p:nvSpPr>
-        <p:spPr/>
-        <p:txBody>
-          <a:bodyPr/>
-          <a:lstStyle/>
-          <a:p>
-            <a:endParaRPr lang="en-US"/>
-          </a:p>
-        </p:txBody>
-      </p:sp>
+        </p:nvPicPr>
+        <p:blipFill>
+          <a:blip r:embed="rId2"/>
+          <a:stretch>
+            <a:fillRect/>
+          </a:stretch>
+        </p:blipFill>
+        <p:spPr>
+          <a:xfrm>
+            <a:off x="1130968" y="1299407"/>
+            <a:ext cx="9756543" cy="5127465"/>
+          </a:xfrm>
+        </p:spPr>
+      </p:pic>
       <p:sp>
         <p:nvSpPr>
           <p:cNvPr id="4" name="Date Placeholder 3">
@@ -8812,7 +9009,7 @@
           <p:cNvPr id="2" name="Title 1">
             <a:extLst>
               <a:ext uri="{FF2B5EF4-FFF2-40B4-BE49-F238E27FC236}">
-                <a16:creationId xmlns:a16="http://schemas.microsoft.com/office/drawing/2014/main" id="{F8975360-F803-3C42-AF8D-F57A7E313E0C}"/>
+                <a16:creationId xmlns:a16="http://schemas.microsoft.com/office/drawing/2014/main" id="{8E73EBD0-4FA7-A042-99D3-26C08ECEDFCC}"/>
               </a:ext>
             </a:extLst>
           </p:cNvPr>
@@ -8823,72 +9020,59 @@
             <p:ph type="title"/>
           </p:nvPr>
         </p:nvSpPr>
-        <p:spPr/>
-        <p:txBody>
-          <a:bodyPr/>
-          <a:lstStyle/>
-          <a:p>
-            <a:r>
-              <a:rPr lang="en-US" dirty="0"/>
-              <a:t>Summary</a:t>
-            </a:r>
-          </a:p>
-        </p:txBody>
-      </p:sp>
-      <p:sp>
-        <p:nvSpPr>
-          <p:cNvPr id="3" name="Content Placeholder 2">
+        <p:spPr>
+          <a:xfrm>
+            <a:off x="646111" y="452718"/>
+            <a:ext cx="9404723" cy="1400530"/>
+          </a:xfrm>
+        </p:spPr>
+        <p:txBody>
+          <a:bodyPr/>
+          <a:lstStyle/>
+          <a:p>
+            <a:r>
+              <a:rPr lang="en-US"/>
+              <a:t>Results Chart</a:t>
+            </a:r>
+            <a:endParaRPr lang="en-US" dirty="0"/>
+          </a:p>
+        </p:txBody>
+      </p:sp>
+      <p:pic>
+        <p:nvPicPr>
+          <p:cNvPr id="8" name="Content Placeholder 7">
             <a:extLst>
               <a:ext uri="{FF2B5EF4-FFF2-40B4-BE49-F238E27FC236}">
-                <a16:creationId xmlns:a16="http://schemas.microsoft.com/office/drawing/2014/main" id="{74982F83-CD13-FD47-8480-E28B2AFB7F41}"/>
+                <a16:creationId xmlns:a16="http://schemas.microsoft.com/office/drawing/2014/main" id="{876DAD22-E890-9048-A9ED-9A58E983C93B}"/>
               </a:ext>
             </a:extLst>
           </p:cNvPr>
-          <p:cNvSpPr>
-            <a:spLocks noGrp="1"/>
-          </p:cNvSpPr>
+          <p:cNvPicPr>
+            <a:picLocks noGrp="1" noChangeAspect="1"/>
+          </p:cNvPicPr>
           <p:nvPr>
             <p:ph idx="1"/>
           </p:nvPr>
-        </p:nvSpPr>
-        <p:spPr/>
-        <p:txBody>
-          <a:bodyPr/>
-          <a:lstStyle/>
-          <a:p>
-            <a:r>
-              <a:rPr lang="en-US" dirty="0"/>
-              <a:t>It is OK to solve problems by throwing $ at them</a:t>
-            </a:r>
-          </a:p>
-          <a:p>
-            <a:pPr lvl="1"/>
-            <a:r>
-              <a:rPr lang="en-US" dirty="0"/>
-              <a:t>Should at least understand what you are paying for.</a:t>
-            </a:r>
-          </a:p>
-          <a:p>
-            <a:pPr lvl="1"/>
-            <a:r>
-              <a:rPr lang="en-US" dirty="0"/>
-              <a:t>Are you getting what you need</a:t>
-            </a:r>
-          </a:p>
-          <a:p>
-            <a:r>
-              <a:rPr lang="en-US" dirty="0"/>
-              <a:t>The obvious solution may not be the right solution</a:t>
-            </a:r>
-          </a:p>
-        </p:txBody>
-      </p:sp>
+        </p:nvPicPr>
+        <p:blipFill>
+          <a:blip r:embed="rId2"/>
+          <a:stretch>
+            <a:fillRect/>
+          </a:stretch>
+        </p:blipFill>
+        <p:spPr>
+          <a:xfrm>
+            <a:off x="1792705" y="1263315"/>
+            <a:ext cx="8624337" cy="5144507"/>
+          </a:xfrm>
+        </p:spPr>
+      </p:pic>
       <p:sp>
         <p:nvSpPr>
           <p:cNvPr id="4" name="Date Placeholder 3">
             <a:extLst>
               <a:ext uri="{FF2B5EF4-FFF2-40B4-BE49-F238E27FC236}">
-                <a16:creationId xmlns:a16="http://schemas.microsoft.com/office/drawing/2014/main" id="{CD4051EC-4570-564A-9E03-754C484B76AD}"/>
+                <a16:creationId xmlns:a16="http://schemas.microsoft.com/office/drawing/2014/main" id="{42049702-75CB-DD48-A85F-AE5A29800FEC}"/>
               </a:ext>
             </a:extLst>
           </p:cNvPr>
@@ -8899,7 +9083,12 @@
             <p:ph type="dt" sz="half" idx="10"/>
           </p:nvPr>
         </p:nvSpPr>
-        <p:spPr/>
+        <p:spPr>
+          <a:xfrm>
+            <a:off x="11124899" y="6448071"/>
+            <a:ext cx="990599" cy="304799"/>
+          </a:xfrm>
+        </p:spPr>
         <p:txBody>
           <a:bodyPr/>
           <a:lstStyle/>
@@ -8917,7 +9106,7 @@
           <p:cNvPr id="5" name="Footer Placeholder 4">
             <a:extLst>
               <a:ext uri="{FF2B5EF4-FFF2-40B4-BE49-F238E27FC236}">
-                <a16:creationId xmlns:a16="http://schemas.microsoft.com/office/drawing/2014/main" id="{9BC31EA6-ABF0-BE48-921A-A87E7E561E48}"/>
+                <a16:creationId xmlns:a16="http://schemas.microsoft.com/office/drawing/2014/main" id="{691D22F4-C452-334E-9518-29358572B28C}"/>
               </a:ext>
             </a:extLst>
           </p:cNvPr>
@@ -8928,7 +9117,12 @@
             <p:ph type="ftr" sz="quarter" idx="11"/>
           </p:nvPr>
         </p:nvSpPr>
-        <p:spPr/>
+        <p:spPr>
+          <a:xfrm>
+            <a:off x="3362840" y="6448069"/>
+            <a:ext cx="4427483" cy="304801"/>
+          </a:xfrm>
+        </p:spPr>
         <p:txBody>
           <a:bodyPr/>
           <a:lstStyle/>
@@ -8946,7 +9140,7 @@
           <p:cNvPr id="6" name="Slide Number Placeholder 5">
             <a:extLst>
               <a:ext uri="{FF2B5EF4-FFF2-40B4-BE49-F238E27FC236}">
-                <a16:creationId xmlns:a16="http://schemas.microsoft.com/office/drawing/2014/main" id="{F4F4554B-FE10-A54B-9D22-8B957E8AA612}"/>
+                <a16:creationId xmlns:a16="http://schemas.microsoft.com/office/drawing/2014/main" id="{33EEBAE1-8E88-C34C-B0A0-300F29E2792F}"/>
               </a:ext>
             </a:extLst>
           </p:cNvPr>
@@ -8957,7 +9151,12 @@
             <p:ph type="sldNum" sz="quarter" idx="12"/>
           </p:nvPr>
         </p:nvSpPr>
-        <p:spPr/>
+        <p:spPr>
+          <a:xfrm>
+            <a:off x="10352540" y="295729"/>
+            <a:ext cx="838199" cy="767687"/>
+          </a:xfrm>
+        </p:spPr>
         <p:txBody>
           <a:bodyPr/>
           <a:lstStyle/>
@@ -8970,10 +9169,123 @@
           </a:p>
         </p:txBody>
       </p:sp>
+      <p:sp>
+        <p:nvSpPr>
+          <p:cNvPr id="9" name="TextBox 8">
+            <a:extLst>
+              <a:ext uri="{FF2B5EF4-FFF2-40B4-BE49-F238E27FC236}">
+                <a16:creationId xmlns:a16="http://schemas.microsoft.com/office/drawing/2014/main" id="{5A40B50F-2DB6-824D-B923-5DACA28D088C}"/>
+              </a:ext>
+            </a:extLst>
+          </p:cNvPr>
+          <p:cNvSpPr txBox="1"/>
+          <p:nvPr/>
+        </p:nvSpPr>
+        <p:spPr>
+          <a:xfrm>
+            <a:off x="2418348" y="6035950"/>
+            <a:ext cx="1143000" cy="369332"/>
+          </a:xfrm>
+          <a:prstGeom prst="rect">
+            <a:avLst/>
+          </a:prstGeom>
+          <a:noFill/>
+        </p:spPr>
+        <p:txBody>
+          <a:bodyPr wrap="square" rtlCol="0">
+            <a:spAutoFit/>
+          </a:bodyPr>
+          <a:lstStyle/>
+          <a:p>
+            <a:r>
+              <a:rPr lang="en-US" dirty="0">
+                <a:solidFill>
+                  <a:schemeClr val="bg1"/>
+                </a:solidFill>
+              </a:rPr>
+              <a:t>Metal</a:t>
+            </a:r>
+          </a:p>
+        </p:txBody>
+      </p:sp>
+      <p:sp>
+        <p:nvSpPr>
+          <p:cNvPr id="40" name="TextBox 39">
+            <a:extLst>
+              <a:ext uri="{FF2B5EF4-FFF2-40B4-BE49-F238E27FC236}">
+                <a16:creationId xmlns:a16="http://schemas.microsoft.com/office/drawing/2014/main" id="{A7E8BE84-D6B3-C64D-B101-A7F7C816C10F}"/>
+              </a:ext>
+            </a:extLst>
+          </p:cNvPr>
+          <p:cNvSpPr txBox="1"/>
+          <p:nvPr/>
+        </p:nvSpPr>
+        <p:spPr>
+          <a:xfrm>
+            <a:off x="6902116" y="6034841"/>
+            <a:ext cx="1143000" cy="369332"/>
+          </a:xfrm>
+          <a:prstGeom prst="rect">
+            <a:avLst/>
+          </a:prstGeom>
+          <a:noFill/>
+        </p:spPr>
+        <p:txBody>
+          <a:bodyPr wrap="square" rtlCol="0">
+            <a:spAutoFit/>
+          </a:bodyPr>
+          <a:lstStyle/>
+          <a:p>
+            <a:r>
+              <a:rPr lang="en-US" dirty="0">
+                <a:solidFill>
+                  <a:schemeClr val="bg1"/>
+                </a:solidFill>
+              </a:rPr>
+              <a:t>AWS</a:t>
+            </a:r>
+          </a:p>
+        </p:txBody>
+      </p:sp>
+      <p:sp>
+        <p:nvSpPr>
+          <p:cNvPr id="10" name="TextBox 9">
+            <a:extLst>
+              <a:ext uri="{FF2B5EF4-FFF2-40B4-BE49-F238E27FC236}">
+                <a16:creationId xmlns:a16="http://schemas.microsoft.com/office/drawing/2014/main" id="{3708ED5F-6A46-C042-A83B-D6CA36BBFA1F}"/>
+              </a:ext>
+            </a:extLst>
+          </p:cNvPr>
+          <p:cNvSpPr txBox="1"/>
+          <p:nvPr/>
+        </p:nvSpPr>
+        <p:spPr>
+          <a:xfrm>
+            <a:off x="279903" y="1479884"/>
+            <a:ext cx="1293695" cy="923330"/>
+          </a:xfrm>
+          <a:prstGeom prst="rect">
+            <a:avLst/>
+          </a:prstGeom>
+          <a:noFill/>
+        </p:spPr>
+        <p:txBody>
+          <a:bodyPr wrap="square" rtlCol="0">
+            <a:spAutoFit/>
+          </a:bodyPr>
+          <a:lstStyle/>
+          <a:p>
+            <a:r>
+              <a:rPr lang="en-US" dirty="0"/>
+              <a:t>Smaller Values are Better</a:t>
+            </a:r>
+          </a:p>
+        </p:txBody>
+      </p:sp>
     </p:spTree>
     <p:extLst>
       <p:ext uri="{BB962C8B-B14F-4D97-AF65-F5344CB8AC3E}">
-        <p14:creationId xmlns:p14="http://schemas.microsoft.com/office/powerpoint/2010/main" val="1563553636"/>
+        <p14:creationId xmlns:p14="http://schemas.microsoft.com/office/powerpoint/2010/main" val="2125540393"/>
       </p:ext>
     </p:extLst>
   </p:cSld>
@@ -9005,7 +9317,7 @@
           <p:cNvPr id="2" name="Title 1">
             <a:extLst>
               <a:ext uri="{FF2B5EF4-FFF2-40B4-BE49-F238E27FC236}">
-                <a16:creationId xmlns:a16="http://schemas.microsoft.com/office/drawing/2014/main" id="{70BDD873-DCAA-9248-A4C8-AD38DE721C7B}"/>
+                <a16:creationId xmlns:a16="http://schemas.microsoft.com/office/drawing/2014/main" id="{968E1392-A39E-9E4F-ABE6-969F86C8E0A4}"/>
               </a:ext>
             </a:extLst>
           </p:cNvPr>
@@ -9023,17 +9335,17 @@
           <a:p>
             <a:r>
               <a:rPr lang="en-US" dirty="0"/>
-              <a:t>Future Work</a:t>
-            </a:r>
-          </a:p>
-        </p:txBody>
-      </p:sp>
-      <p:sp>
-        <p:nvSpPr>
-          <p:cNvPr id="3" name="Content Placeholder 2">
+              <a:t>Results Chart w/ TPS</a:t>
+            </a:r>
+          </a:p>
+        </p:txBody>
+      </p:sp>
+      <p:sp>
+        <p:nvSpPr>
+          <p:cNvPr id="4" name="Date Placeholder 3">
             <a:extLst>
               <a:ext uri="{FF2B5EF4-FFF2-40B4-BE49-F238E27FC236}">
-                <a16:creationId xmlns:a16="http://schemas.microsoft.com/office/drawing/2014/main" id="{5FBBB0AF-80B2-4840-8B0B-E0286BBC40A0}"/>
+                <a16:creationId xmlns:a16="http://schemas.microsoft.com/office/drawing/2014/main" id="{C9F94ABF-2117-C74C-8E41-C4DFF81C10AE}"/>
               </a:ext>
             </a:extLst>
           </p:cNvPr>
@@ -9041,137 +9353,28 @@
             <a:spLocks noGrp="1"/>
           </p:cNvSpPr>
           <p:nvPr>
-            <p:ph idx="1"/>
-          </p:nvPr>
-        </p:nvSpPr>
-        <p:spPr>
-          <a:xfrm>
-            <a:off x="481264" y="1540042"/>
-            <a:ext cx="10709476" cy="4708357"/>
-          </a:xfrm>
-        </p:spPr>
-        <p:txBody>
-          <a:bodyPr>
-            <a:normAutofit lnSpcReduction="10000"/>
-          </a:bodyPr>
-          <a:lstStyle/>
-          <a:p>
-            <a:r>
-              <a:rPr lang="en-US" dirty="0"/>
-              <a:t>Expand the Trade Study</a:t>
-            </a:r>
-          </a:p>
-          <a:p>
-            <a:pPr lvl="1"/>
-            <a:r>
-              <a:rPr lang="en-US" dirty="0"/>
-              <a:t>Metal Configurations / Co-Lo (rent-a-box)</a:t>
-            </a:r>
-          </a:p>
-          <a:p>
-            <a:pPr lvl="1"/>
-            <a:r>
-              <a:rPr lang="en-US" dirty="0"/>
-              <a:t>Private Clouds </a:t>
-            </a:r>
-          </a:p>
-          <a:p>
-            <a:pPr lvl="2"/>
-            <a:r>
-              <a:rPr lang="en-US" dirty="0"/>
-              <a:t>Nutanix, DC/OS on Metal, Tectonic/OpenShift on Metal</a:t>
-            </a:r>
-          </a:p>
-          <a:p>
-            <a:pPr lvl="2"/>
-            <a:r>
-              <a:rPr lang="en-US" dirty="0"/>
-              <a:t>Various SDS solutions (</a:t>
-            </a:r>
-            <a:r>
-              <a:rPr lang="en-US" dirty="0" err="1"/>
-              <a:t>OpenEBS</a:t>
-            </a:r>
-            <a:r>
-              <a:rPr lang="en-US" dirty="0"/>
-              <a:t>, </a:t>
-            </a:r>
-            <a:r>
-              <a:rPr lang="en-US" dirty="0" err="1"/>
-              <a:t>Portworx</a:t>
-            </a:r>
-            <a:r>
-              <a:rPr lang="en-US" dirty="0"/>
-              <a:t>, Rook, </a:t>
-            </a:r>
-            <a:r>
-              <a:rPr lang="en-US" dirty="0" err="1"/>
-              <a:t>ScaleIO</a:t>
-            </a:r>
-            <a:r>
-              <a:rPr lang="en-US" dirty="0"/>
-              <a:t>, etc.)</a:t>
-            </a:r>
-          </a:p>
-          <a:p>
-            <a:pPr lvl="1"/>
-            <a:r>
-              <a:rPr lang="en-US" dirty="0"/>
-              <a:t>Public Clouds</a:t>
-            </a:r>
-          </a:p>
-          <a:p>
-            <a:pPr lvl="2"/>
-            <a:r>
-              <a:rPr lang="en-US" dirty="0"/>
-              <a:t>Azure, Rackspace, Digital Ocean, Google Cloud</a:t>
-            </a:r>
-          </a:p>
-          <a:p>
-            <a:r>
-              <a:rPr lang="en-US" dirty="0"/>
-              <a:t>Refine the approach</a:t>
-            </a:r>
-          </a:p>
-          <a:p>
-            <a:pPr lvl="1"/>
-            <a:r>
-              <a:rPr lang="en-US" dirty="0"/>
-              <a:t>Additional considerations </a:t>
-            </a:r>
-          </a:p>
-          <a:p>
-            <a:pPr lvl="2"/>
-            <a:r>
-              <a:rPr lang="en-US" dirty="0"/>
-              <a:t>Technical </a:t>
-            </a:r>
-          </a:p>
-          <a:p>
-            <a:pPr lvl="2"/>
-            <a:r>
-              <a:rPr lang="en-US" dirty="0"/>
-              <a:t>Cost</a:t>
-            </a:r>
-          </a:p>
-          <a:p>
-            <a:r>
-              <a:rPr lang="en-US" dirty="0"/>
-              <a:t>Focus is still on TCO for a given set of requirements</a:t>
-            </a:r>
-          </a:p>
-          <a:p>
-            <a:pPr lvl="1"/>
-            <a:endParaRPr lang="en-US" dirty="0"/>
-          </a:p>
-        </p:txBody>
-      </p:sp>
-      <p:sp>
-        <p:nvSpPr>
-          <p:cNvPr id="4" name="Date Placeholder 3">
+            <p:ph type="dt" sz="half" idx="10"/>
+          </p:nvPr>
+        </p:nvSpPr>
+        <p:spPr/>
+        <p:txBody>
+          <a:bodyPr/>
+          <a:lstStyle/>
+          <a:p>
+            <a:r>
+              <a:rPr lang="en-US"/>
+              <a:t>3/21/2019</a:t>
+            </a:r>
+            <a:endParaRPr lang="en-US" dirty="0"/>
+          </a:p>
+        </p:txBody>
+      </p:sp>
+      <p:sp>
+        <p:nvSpPr>
+          <p:cNvPr id="5" name="Footer Placeholder 4">
             <a:extLst>
               <a:ext uri="{FF2B5EF4-FFF2-40B4-BE49-F238E27FC236}">
-                <a16:creationId xmlns:a16="http://schemas.microsoft.com/office/drawing/2014/main" id="{34C5C411-6C99-DB42-83D1-D4940A289A80}"/>
+                <a16:creationId xmlns:a16="http://schemas.microsoft.com/office/drawing/2014/main" id="{87CC7315-6977-7F4C-B587-7D7DA857425C}"/>
               </a:ext>
             </a:extLst>
           </p:cNvPr>
@@ -9179,35 +9382,6 @@
             <a:spLocks noGrp="1"/>
           </p:cNvSpPr>
           <p:nvPr>
-            <p:ph type="dt" sz="half" idx="10"/>
-          </p:nvPr>
-        </p:nvSpPr>
-        <p:spPr/>
-        <p:txBody>
-          <a:bodyPr/>
-          <a:lstStyle/>
-          <a:p>
-            <a:r>
-              <a:rPr lang="en-US"/>
-              <a:t>3/21/2019</a:t>
-            </a:r>
-            <a:endParaRPr lang="en-US" dirty="0"/>
-          </a:p>
-        </p:txBody>
-      </p:sp>
-      <p:sp>
-        <p:nvSpPr>
-          <p:cNvPr id="5" name="Footer Placeholder 4">
-            <a:extLst>
-              <a:ext uri="{FF2B5EF4-FFF2-40B4-BE49-F238E27FC236}">
-                <a16:creationId xmlns:a16="http://schemas.microsoft.com/office/drawing/2014/main" id="{D5ACC473-C101-0149-B922-3C33BFA34BE8}"/>
-              </a:ext>
-            </a:extLst>
-          </p:cNvPr>
-          <p:cNvSpPr>
-            <a:spLocks noGrp="1"/>
-          </p:cNvSpPr>
-          <p:nvPr>
             <p:ph type="ftr" sz="quarter" idx="11"/>
           </p:nvPr>
         </p:nvSpPr>
@@ -9229,7 +9403,7 @@
           <p:cNvPr id="6" name="Slide Number Placeholder 5">
             <a:extLst>
               <a:ext uri="{FF2B5EF4-FFF2-40B4-BE49-F238E27FC236}">
-                <a16:creationId xmlns:a16="http://schemas.microsoft.com/office/drawing/2014/main" id="{B4D98C5B-150D-9F47-9793-48AA62F4D36C}"/>
+                <a16:creationId xmlns:a16="http://schemas.microsoft.com/office/drawing/2014/main" id="{3820F22F-79CF-B843-A29B-0E6DE19BD0CD}"/>
               </a:ext>
             </a:extLst>
           </p:cNvPr>
@@ -9253,10 +9427,39 @@
           </a:p>
         </p:txBody>
       </p:sp>
+      <p:pic>
+        <p:nvPicPr>
+          <p:cNvPr id="12" name="Content Placeholder 11">
+            <a:extLst>
+              <a:ext uri="{FF2B5EF4-FFF2-40B4-BE49-F238E27FC236}">
+                <a16:creationId xmlns:a16="http://schemas.microsoft.com/office/drawing/2014/main" id="{203A562C-6D88-C24B-B43C-191A86AD01CA}"/>
+              </a:ext>
+            </a:extLst>
+          </p:cNvPr>
+          <p:cNvPicPr>
+            <a:picLocks noGrp="1" noChangeAspect="1"/>
+          </p:cNvPicPr>
+          <p:nvPr>
+            <p:ph idx="1"/>
+          </p:nvPr>
+        </p:nvPicPr>
+        <p:blipFill>
+          <a:blip r:embed="rId3"/>
+          <a:stretch>
+            <a:fillRect/>
+          </a:stretch>
+        </p:blipFill>
+        <p:spPr>
+          <a:xfrm>
+            <a:off x="1455822" y="1253664"/>
+            <a:ext cx="8734926" cy="5210475"/>
+          </a:xfrm>
+        </p:spPr>
+      </p:pic>
     </p:spTree>
     <p:extLst>
       <p:ext uri="{BB962C8B-B14F-4D97-AF65-F5344CB8AC3E}">
-        <p14:creationId xmlns:p14="http://schemas.microsoft.com/office/powerpoint/2010/main" val="4220377167"/>
+        <p14:creationId xmlns:p14="http://schemas.microsoft.com/office/powerpoint/2010/main" val="4201414593"/>
       </p:ext>
     </p:extLst>
   </p:cSld>
@@ -9288,7 +9491,7 @@
           <p:cNvPr id="2" name="Title 1">
             <a:extLst>
               <a:ext uri="{FF2B5EF4-FFF2-40B4-BE49-F238E27FC236}">
-                <a16:creationId xmlns:a16="http://schemas.microsoft.com/office/drawing/2014/main" id="{A5EA4341-702A-D549-926E-30E0724A4347}"/>
+                <a16:creationId xmlns:a16="http://schemas.microsoft.com/office/drawing/2014/main" id="{17246904-DD5B-6B48-A14B-770C2BE089A6}"/>
               </a:ext>
             </a:extLst>
           </p:cNvPr>
@@ -9306,7 +9509,83 @@
           <a:p>
             <a:r>
               <a:rPr lang="en-US" dirty="0"/>
-              <a:t>Questions and Discussion</a:t>
+              <a:t>Results Analysis</a:t>
+            </a:r>
+          </a:p>
+        </p:txBody>
+      </p:sp>
+      <p:sp>
+        <p:nvSpPr>
+          <p:cNvPr id="3" name="Content Placeholder 2">
+            <a:extLst>
+              <a:ext uri="{FF2B5EF4-FFF2-40B4-BE49-F238E27FC236}">
+                <a16:creationId xmlns:a16="http://schemas.microsoft.com/office/drawing/2014/main" id="{81508139-5889-D347-92A3-79FD731B50DA}"/>
+              </a:ext>
+            </a:extLst>
+          </p:cNvPr>
+          <p:cNvSpPr>
+            <a:spLocks noGrp="1"/>
+          </p:cNvSpPr>
+          <p:nvPr>
+            <p:ph idx="1"/>
+          </p:nvPr>
+        </p:nvSpPr>
+        <p:spPr/>
+        <p:txBody>
+          <a:bodyPr/>
+          <a:lstStyle/>
+          <a:p>
+            <a:r>
+              <a:rPr lang="en-US" dirty="0"/>
+              <a:t>RDS</a:t>
+            </a:r>
+          </a:p>
+          <a:p>
+            <a:pPr lvl="1"/>
+            <a:r>
+              <a:rPr lang="en-US" dirty="0"/>
+              <a:t>There is a plateau point for a given instance size</a:t>
+            </a:r>
+          </a:p>
+          <a:p>
+            <a:pPr lvl="2"/>
+            <a:r>
+              <a:rPr lang="en-US" dirty="0"/>
+              <a:t>Increasing the disk IOPS evaporates money for no performance benefit</a:t>
+            </a:r>
+          </a:p>
+          <a:p>
+            <a:pPr lvl="2"/>
+            <a:r>
+              <a:rPr lang="en-US" dirty="0"/>
+              <a:t>Unable identify an obvious cause for larger instances: CPU isn’t pegged</a:t>
+            </a:r>
+          </a:p>
+          <a:p>
+            <a:pPr lvl="2"/>
+            <a:r>
+              <a:rPr lang="en-US" dirty="0"/>
+              <a:t>Would be nice if AWS RDS was smart enough to set limits here for you</a:t>
+            </a:r>
+          </a:p>
+          <a:p>
+            <a:pPr lvl="1"/>
+            <a:r>
+              <a:rPr lang="en-US" dirty="0"/>
+              <a:t>Small and medium instances better value</a:t>
+            </a:r>
+          </a:p>
+          <a:p>
+            <a:r>
+              <a:rPr lang="en-US" dirty="0"/>
+              <a:t>EC2</a:t>
+            </a:r>
+          </a:p>
+          <a:p>
+            <a:pPr lvl="1"/>
+            <a:r>
+              <a:rPr lang="en-US" dirty="0"/>
+              <a:t>For larger instances (r5.12xlarge) it appears to be trivially easy to beat RDS</a:t>
             </a:r>
           </a:p>
         </p:txBody>
@@ -9316,7 +9595,7 @@
           <p:cNvPr id="4" name="Date Placeholder 3">
             <a:extLst>
               <a:ext uri="{FF2B5EF4-FFF2-40B4-BE49-F238E27FC236}">
-                <a16:creationId xmlns:a16="http://schemas.microsoft.com/office/drawing/2014/main" id="{FA3B3CC7-AFD1-624B-B1C5-C1C9D0F71189}"/>
+                <a16:creationId xmlns:a16="http://schemas.microsoft.com/office/drawing/2014/main" id="{77C66340-1CFF-4243-A205-BD3448732CE9}"/>
               </a:ext>
             </a:extLst>
           </p:cNvPr>
@@ -9345,7 +9624,7 @@
           <p:cNvPr id="5" name="Footer Placeholder 4">
             <a:extLst>
               <a:ext uri="{FF2B5EF4-FFF2-40B4-BE49-F238E27FC236}">
-                <a16:creationId xmlns:a16="http://schemas.microsoft.com/office/drawing/2014/main" id="{720483F0-B644-D24A-8F70-B0D10CEAA84B}"/>
+                <a16:creationId xmlns:a16="http://schemas.microsoft.com/office/drawing/2014/main" id="{AE3F1324-5F20-FD43-ADD0-6F7E071C2F0D}"/>
               </a:ext>
             </a:extLst>
           </p:cNvPr>
@@ -9374,7 +9653,7 @@
           <p:cNvPr id="6" name="Slide Number Placeholder 5">
             <a:extLst>
               <a:ext uri="{FF2B5EF4-FFF2-40B4-BE49-F238E27FC236}">
-                <a16:creationId xmlns:a16="http://schemas.microsoft.com/office/drawing/2014/main" id="{74FCB0E1-8677-4E41-8772-813EA637639C}"/>
+                <a16:creationId xmlns:a16="http://schemas.microsoft.com/office/drawing/2014/main" id="{DE6AEB08-2838-D44F-B0A9-3118FE665C10}"/>
               </a:ext>
             </a:extLst>
           </p:cNvPr>
@@ -9398,56 +9677,10 @@
           </a:p>
         </p:txBody>
       </p:sp>
-      <p:sp>
-        <p:nvSpPr>
-          <p:cNvPr id="7" name="TextBox 6">
-            <a:extLst>
-              <a:ext uri="{FF2B5EF4-FFF2-40B4-BE49-F238E27FC236}">
-                <a16:creationId xmlns:a16="http://schemas.microsoft.com/office/drawing/2014/main" id="{657920D1-C804-994A-B98D-F26E693CB374}"/>
-              </a:ext>
-            </a:extLst>
-          </p:cNvPr>
-          <p:cNvSpPr txBox="1"/>
-          <p:nvPr/>
-        </p:nvSpPr>
-        <p:spPr>
-          <a:xfrm>
-            <a:off x="1746584" y="2979366"/>
-            <a:ext cx="8698831" cy="1754326"/>
-          </a:xfrm>
-          <a:prstGeom prst="rect">
-            <a:avLst/>
-          </a:prstGeom>
-          <a:noFill/>
-        </p:spPr>
-        <p:txBody>
-          <a:bodyPr wrap="square" rtlCol="0">
-            <a:spAutoFit/>
-          </a:bodyPr>
-          <a:lstStyle/>
-          <a:p>
-            <a:pPr algn="ctr"/>
-            <a:r>
-              <a:rPr lang="en-US" sz="3600" dirty="0"/>
-              <a:t>Thanks for your attention.</a:t>
-            </a:r>
-          </a:p>
-          <a:p>
-            <a:endParaRPr lang="en-US" sz="3600" dirty="0"/>
-          </a:p>
-          <a:p>
-            <a:pPr algn="ctr"/>
-            <a:r>
-              <a:rPr lang="en-US" sz="3600" dirty="0"/>
-              <a:t>Questions? </a:t>
-            </a:r>
-          </a:p>
-        </p:txBody>
-      </p:sp>
     </p:spTree>
     <p:extLst>
       <p:ext uri="{BB962C8B-B14F-4D97-AF65-F5344CB8AC3E}">
-        <p14:creationId xmlns:p14="http://schemas.microsoft.com/office/powerpoint/2010/main" val="1501694016"/>
+        <p14:creationId xmlns:p14="http://schemas.microsoft.com/office/powerpoint/2010/main" val="1030460518"/>
       </p:ext>
     </p:extLst>
   </p:cSld>
@@ -9525,12 +9758,14 @@
         </p:nvSpPr>
         <p:spPr>
           <a:xfrm>
-            <a:off x="1103312" y="2052918"/>
-            <a:ext cx="8946541" cy="4195481"/>
+            <a:off x="1103312" y="1840838"/>
+            <a:ext cx="9544635" cy="4475747"/>
           </a:xfrm>
         </p:spPr>
         <p:txBody>
-          <a:bodyPr/>
+          <a:bodyPr>
+            <a:normAutofit/>
+          </a:bodyPr>
           <a:lstStyle/>
           <a:p>
             <a:r>
@@ -9559,6 +9794,16 @@
               <a:rPr lang="en-US" dirty="0"/>
               <a:t>Specializing in software compliant w/ ISO13485:2016 and ISO/IEC62304</a:t>
             </a:r>
+          </a:p>
+          <a:p>
+            <a:pPr lvl="1"/>
+            <a:r>
+              <a:rPr lang="en-US" dirty="0">
+                <a:hlinkClick r:id="rId2"/>
+              </a:rPr>
+              <a:t>https://www.medacuitysoftware.com/</a:t>
+            </a:r>
+            <a:endParaRPr lang="en-US" dirty="0"/>
           </a:p>
           <a:p>
             <a:r>
@@ -9748,7 +9993,7 @@
           <p:cNvPr id="2" name="Title 1">
             <a:extLst>
               <a:ext uri="{FF2B5EF4-FFF2-40B4-BE49-F238E27FC236}">
-                <a16:creationId xmlns:a16="http://schemas.microsoft.com/office/drawing/2014/main" id="{C4AEB51F-C0C4-3840-BF5B-F7206A592C55}"/>
+                <a16:creationId xmlns:a16="http://schemas.microsoft.com/office/drawing/2014/main" id="{06DF2EFA-A617-6843-8964-5FF859482925}"/>
               </a:ext>
             </a:extLst>
           </p:cNvPr>
@@ -9766,7 +10011,7 @@
           <a:p>
             <a:r>
               <a:rPr lang="en-US" dirty="0"/>
-              <a:t>Extra Material</a:t>
+              <a:t>Analysis</a:t>
             </a:r>
           </a:p>
         </p:txBody>
@@ -9776,7 +10021,7 @@
           <p:cNvPr id="3" name="Content Placeholder 2">
             <a:extLst>
               <a:ext uri="{FF2B5EF4-FFF2-40B4-BE49-F238E27FC236}">
-                <a16:creationId xmlns:a16="http://schemas.microsoft.com/office/drawing/2014/main" id="{3093E383-6C78-5A47-B338-F8C7C1DC351C}"/>
+                <a16:creationId xmlns:a16="http://schemas.microsoft.com/office/drawing/2014/main" id="{41FCDE88-E47E-FB4F-83AB-D1ED9C571C29}"/>
               </a:ext>
             </a:extLst>
           </p:cNvPr>
@@ -9787,12 +10032,99 @@
             <p:ph idx="1"/>
           </p:nvPr>
         </p:nvSpPr>
-        <p:spPr/>
-        <p:txBody>
-          <a:bodyPr/>
-          <a:lstStyle/>
-          <a:p>
-            <a:endParaRPr lang="en-US"/>
+        <p:spPr>
+          <a:xfrm>
+            <a:off x="878305" y="1347538"/>
+            <a:ext cx="9853863" cy="5057744"/>
+          </a:xfrm>
+        </p:spPr>
+        <p:txBody>
+          <a:bodyPr>
+            <a:normAutofit/>
+          </a:bodyPr>
+          <a:lstStyle/>
+          <a:p>
+            <a:r>
+              <a:rPr lang="en-US" dirty="0"/>
+              <a:t>For the simple, non-redundant case</a:t>
+            </a:r>
+          </a:p>
+          <a:p>
+            <a:pPr lvl="1"/>
+            <a:r>
+              <a:rPr lang="en-US" dirty="0"/>
+              <a:t>Metal is king. Bar none. This laptop matches a m5.xlarge at ~1/5</a:t>
+            </a:r>
+            <a:r>
+              <a:rPr lang="en-US" baseline="30000" dirty="0"/>
+              <a:t>th</a:t>
+            </a:r>
+            <a:r>
+              <a:rPr lang="en-US" dirty="0"/>
+              <a:t> the cost ratio</a:t>
+            </a:r>
+          </a:p>
+          <a:p>
+            <a:pPr lvl="1"/>
+            <a:r>
+              <a:rPr lang="en-US" dirty="0"/>
+              <a:t>DBaaS has certain price/performance points where its maybe worthwhile</a:t>
+            </a:r>
+          </a:p>
+          <a:p>
+            <a:pPr lvl="1"/>
+            <a:r>
+              <a:rPr lang="en-US" dirty="0"/>
+              <a:t>DevOps for this case is easy</a:t>
+            </a:r>
+          </a:p>
+          <a:p>
+            <a:pPr lvl="2"/>
+            <a:r>
+              <a:rPr lang="en-US" dirty="0"/>
+              <a:t>Do some analysis</a:t>
+            </a:r>
+          </a:p>
+          <a:p>
+            <a:pPr lvl="2"/>
+            <a:r>
+              <a:rPr lang="en-US" dirty="0"/>
+              <a:t>If run-your-own is cheaper (EC2) then do it!</a:t>
+            </a:r>
+          </a:p>
+          <a:p>
+            <a:r>
+              <a:rPr lang="en-US" dirty="0"/>
+              <a:t>Future Work: Complex Cases: Multi-master, Replicas</a:t>
+            </a:r>
+          </a:p>
+          <a:p>
+            <a:pPr lvl="1"/>
+            <a:r>
+              <a:rPr lang="en-US" dirty="0"/>
+              <a:t>The story is much less clear </a:t>
+            </a:r>
+          </a:p>
+          <a:p>
+            <a:pPr lvl="2"/>
+            <a:r>
+              <a:rPr lang="en-US" dirty="0"/>
+              <a:t>How much is DevOps time worth?</a:t>
+            </a:r>
+          </a:p>
+          <a:p>
+            <a:pPr lvl="1"/>
+            <a:r>
+              <a:rPr lang="en-US" dirty="0"/>
+              <a:t>Know of companies spending substantial engineering $ to avoid DBaaS</a:t>
+            </a:r>
+          </a:p>
+          <a:p>
+            <a:pPr lvl="1"/>
+            <a:r>
+              <a:rPr lang="en-US" dirty="0"/>
+              <a:t>Understand and test the failure cases. Try that with DBaaS.</a:t>
+            </a:r>
           </a:p>
         </p:txBody>
       </p:sp>
@@ -9801,7 +10133,7 @@
           <p:cNvPr id="4" name="Date Placeholder 3">
             <a:extLst>
               <a:ext uri="{FF2B5EF4-FFF2-40B4-BE49-F238E27FC236}">
-                <a16:creationId xmlns:a16="http://schemas.microsoft.com/office/drawing/2014/main" id="{CF39E177-F106-414A-BF42-51601A356750}"/>
+                <a16:creationId xmlns:a16="http://schemas.microsoft.com/office/drawing/2014/main" id="{FCDC852E-6B3D-D245-9C35-3A9A17231C0F}"/>
               </a:ext>
             </a:extLst>
           </p:cNvPr>
@@ -9830,7 +10162,7 @@
           <p:cNvPr id="5" name="Footer Placeholder 4">
             <a:extLst>
               <a:ext uri="{FF2B5EF4-FFF2-40B4-BE49-F238E27FC236}">
-                <a16:creationId xmlns:a16="http://schemas.microsoft.com/office/drawing/2014/main" id="{7C564C07-03AC-D94B-905F-B821368A9179}"/>
+                <a16:creationId xmlns:a16="http://schemas.microsoft.com/office/drawing/2014/main" id="{75CB1556-B4BB-6549-8759-13BE53827D46}"/>
               </a:ext>
             </a:extLst>
           </p:cNvPr>
@@ -9859,7 +10191,7 @@
           <p:cNvPr id="6" name="Slide Number Placeholder 5">
             <a:extLst>
               <a:ext uri="{FF2B5EF4-FFF2-40B4-BE49-F238E27FC236}">
-                <a16:creationId xmlns:a16="http://schemas.microsoft.com/office/drawing/2014/main" id="{CFFBE9A3-F261-5A43-AA43-EC549C6E58B8}"/>
+                <a16:creationId xmlns:a16="http://schemas.microsoft.com/office/drawing/2014/main" id="{6ED40DE8-2E7A-9B4F-8988-8273126F962E}"/>
               </a:ext>
             </a:extLst>
           </p:cNvPr>
@@ -9886,7 +10218,7 @@
     </p:spTree>
     <p:extLst>
       <p:ext uri="{BB962C8B-B14F-4D97-AF65-F5344CB8AC3E}">
-        <p14:creationId xmlns:p14="http://schemas.microsoft.com/office/powerpoint/2010/main" val="1008189970"/>
+        <p14:creationId xmlns:p14="http://schemas.microsoft.com/office/powerpoint/2010/main" val="2710888791"/>
       </p:ext>
     </p:extLst>
   </p:cSld>
@@ -9918,6 +10250,1201 @@
           <p:cNvPr id="2" name="Title 1">
             <a:extLst>
               <a:ext uri="{FF2B5EF4-FFF2-40B4-BE49-F238E27FC236}">
+                <a16:creationId xmlns:a16="http://schemas.microsoft.com/office/drawing/2014/main" id="{F8975360-F803-3C42-AF8D-F57A7E313E0C}"/>
+              </a:ext>
+            </a:extLst>
+          </p:cNvPr>
+          <p:cNvSpPr>
+            <a:spLocks noGrp="1"/>
+          </p:cNvSpPr>
+          <p:nvPr>
+            <p:ph type="title"/>
+          </p:nvPr>
+        </p:nvSpPr>
+        <p:spPr/>
+        <p:txBody>
+          <a:bodyPr/>
+          <a:lstStyle/>
+          <a:p>
+            <a:r>
+              <a:rPr lang="en-US" dirty="0"/>
+              <a:t>Summary</a:t>
+            </a:r>
+          </a:p>
+        </p:txBody>
+      </p:sp>
+      <p:sp>
+        <p:nvSpPr>
+          <p:cNvPr id="3" name="Content Placeholder 2">
+            <a:extLst>
+              <a:ext uri="{FF2B5EF4-FFF2-40B4-BE49-F238E27FC236}">
+                <a16:creationId xmlns:a16="http://schemas.microsoft.com/office/drawing/2014/main" id="{74982F83-CD13-FD47-8480-E28B2AFB7F41}"/>
+              </a:ext>
+            </a:extLst>
+          </p:cNvPr>
+          <p:cNvSpPr>
+            <a:spLocks noGrp="1"/>
+          </p:cNvSpPr>
+          <p:nvPr>
+            <p:ph idx="1"/>
+          </p:nvPr>
+        </p:nvSpPr>
+        <p:spPr/>
+        <p:txBody>
+          <a:bodyPr/>
+          <a:lstStyle/>
+          <a:p>
+            <a:r>
+              <a:rPr lang="en-US" dirty="0"/>
+              <a:t>It is OK to solve problems by throwing $ at them</a:t>
+            </a:r>
+          </a:p>
+          <a:p>
+            <a:pPr lvl="1"/>
+            <a:r>
+              <a:rPr lang="en-US" dirty="0"/>
+              <a:t>Should at least understand what you are paying for.</a:t>
+            </a:r>
+          </a:p>
+          <a:p>
+            <a:pPr lvl="1"/>
+            <a:r>
+              <a:rPr lang="en-US" dirty="0"/>
+              <a:t>Are you getting what you need</a:t>
+            </a:r>
+          </a:p>
+          <a:p>
+            <a:r>
+              <a:rPr lang="en-US" dirty="0"/>
+              <a:t>The obvious solution may not be the right solution</a:t>
+            </a:r>
+          </a:p>
+          <a:p>
+            <a:pPr lvl="1"/>
+            <a:r>
+              <a:rPr lang="en-US" dirty="0"/>
+              <a:t>EC2 may be better than RDS for large sizes</a:t>
+            </a:r>
+          </a:p>
+          <a:p>
+            <a:r>
+              <a:rPr lang="en-US" dirty="0"/>
+              <a:t>Don’t boil the ocean</a:t>
+            </a:r>
+          </a:p>
+          <a:p>
+            <a:pPr lvl="1"/>
+            <a:r>
+              <a:rPr lang="en-US" dirty="0"/>
+              <a:t>Understand your redundancy and DR requirements</a:t>
+            </a:r>
+          </a:p>
+          <a:p>
+            <a:pPr lvl="1"/>
+            <a:r>
+              <a:rPr lang="en-US" dirty="0"/>
+              <a:t>Build to fit with a little room to grow</a:t>
+            </a:r>
+          </a:p>
+        </p:txBody>
+      </p:sp>
+      <p:sp>
+        <p:nvSpPr>
+          <p:cNvPr id="4" name="Date Placeholder 3">
+            <a:extLst>
+              <a:ext uri="{FF2B5EF4-FFF2-40B4-BE49-F238E27FC236}">
+                <a16:creationId xmlns:a16="http://schemas.microsoft.com/office/drawing/2014/main" id="{CD4051EC-4570-564A-9E03-754C484B76AD}"/>
+              </a:ext>
+            </a:extLst>
+          </p:cNvPr>
+          <p:cNvSpPr>
+            <a:spLocks noGrp="1"/>
+          </p:cNvSpPr>
+          <p:nvPr>
+            <p:ph type="dt" sz="half" idx="10"/>
+          </p:nvPr>
+        </p:nvSpPr>
+        <p:spPr/>
+        <p:txBody>
+          <a:bodyPr/>
+          <a:lstStyle/>
+          <a:p>
+            <a:r>
+              <a:rPr lang="en-US"/>
+              <a:t>3/21/2019</a:t>
+            </a:r>
+            <a:endParaRPr lang="en-US" dirty="0"/>
+          </a:p>
+        </p:txBody>
+      </p:sp>
+      <p:sp>
+        <p:nvSpPr>
+          <p:cNvPr id="5" name="Footer Placeholder 4">
+            <a:extLst>
+              <a:ext uri="{FF2B5EF4-FFF2-40B4-BE49-F238E27FC236}">
+                <a16:creationId xmlns:a16="http://schemas.microsoft.com/office/drawing/2014/main" id="{9BC31EA6-ABF0-BE48-921A-A87E7E561E48}"/>
+              </a:ext>
+            </a:extLst>
+          </p:cNvPr>
+          <p:cNvSpPr>
+            <a:spLocks noGrp="1"/>
+          </p:cNvSpPr>
+          <p:nvPr>
+            <p:ph type="ftr" sz="quarter" idx="11"/>
+          </p:nvPr>
+        </p:nvSpPr>
+        <p:spPr/>
+        <p:txBody>
+          <a:bodyPr/>
+          <a:lstStyle/>
+          <a:p>
+            <a:r>
+              <a:rPr lang="en-US"/>
+              <a:t>Copyright © 2019 by Jeffrey Zampieron All rights reserved.</a:t>
+            </a:r>
+            <a:endParaRPr lang="en-US" dirty="0"/>
+          </a:p>
+        </p:txBody>
+      </p:sp>
+      <p:sp>
+        <p:nvSpPr>
+          <p:cNvPr id="6" name="Slide Number Placeholder 5">
+            <a:extLst>
+              <a:ext uri="{FF2B5EF4-FFF2-40B4-BE49-F238E27FC236}">
+                <a16:creationId xmlns:a16="http://schemas.microsoft.com/office/drawing/2014/main" id="{F4F4554B-FE10-A54B-9D22-8B957E8AA612}"/>
+              </a:ext>
+            </a:extLst>
+          </p:cNvPr>
+          <p:cNvSpPr>
+            <a:spLocks noGrp="1"/>
+          </p:cNvSpPr>
+          <p:nvPr>
+            <p:ph type="sldNum" sz="quarter" idx="12"/>
+          </p:nvPr>
+        </p:nvSpPr>
+        <p:spPr/>
+        <p:txBody>
+          <a:bodyPr/>
+          <a:lstStyle/>
+          <a:p>
+            <a:fld id="{D57F1E4F-1CFF-5643-939E-02111984F565}" type="slidenum">
+              <a:rPr lang="en-US" smtClean="0"/>
+              <a:t>21</a:t>
+            </a:fld>
+            <a:endParaRPr lang="en-US" dirty="0"/>
+          </a:p>
+        </p:txBody>
+      </p:sp>
+    </p:spTree>
+    <p:extLst>
+      <p:ext uri="{BB962C8B-B14F-4D97-AF65-F5344CB8AC3E}">
+        <p14:creationId xmlns:p14="http://schemas.microsoft.com/office/powerpoint/2010/main" val="1563553636"/>
+      </p:ext>
+    </p:extLst>
+  </p:cSld>
+  <p:clrMapOvr>
+    <a:masterClrMapping/>
+  </p:clrMapOvr>
+</p:sld>
+</file>
+
+<file path=ppt/slides/slide22.xml><?xml version="1.0" encoding="utf-8"?>
+<p:sld xmlns:a="http://schemas.openxmlformats.org/drawingml/2006/main" xmlns:r="http://schemas.openxmlformats.org/officeDocument/2006/relationships" xmlns:p="http://schemas.openxmlformats.org/presentationml/2006/main">
+  <p:cSld>
+    <p:spTree>
+      <p:nvGrpSpPr>
+        <p:cNvPr id="1" name=""/>
+        <p:cNvGrpSpPr/>
+        <p:nvPr/>
+      </p:nvGrpSpPr>
+      <p:grpSpPr>
+        <a:xfrm>
+          <a:off x="0" y="0"/>
+          <a:ext cx="0" cy="0"/>
+          <a:chOff x="0" y="0"/>
+          <a:chExt cx="0" cy="0"/>
+        </a:xfrm>
+      </p:grpSpPr>
+      <p:sp>
+        <p:nvSpPr>
+          <p:cNvPr id="2" name="Title 1">
+            <a:extLst>
+              <a:ext uri="{FF2B5EF4-FFF2-40B4-BE49-F238E27FC236}">
+                <a16:creationId xmlns:a16="http://schemas.microsoft.com/office/drawing/2014/main" id="{70BDD873-DCAA-9248-A4C8-AD38DE721C7B}"/>
+              </a:ext>
+            </a:extLst>
+          </p:cNvPr>
+          <p:cNvSpPr>
+            <a:spLocks noGrp="1"/>
+          </p:cNvSpPr>
+          <p:nvPr>
+            <p:ph type="title"/>
+          </p:nvPr>
+        </p:nvSpPr>
+        <p:spPr/>
+        <p:txBody>
+          <a:bodyPr/>
+          <a:lstStyle/>
+          <a:p>
+            <a:r>
+              <a:rPr lang="en-US" dirty="0"/>
+              <a:t>Future Work</a:t>
+            </a:r>
+          </a:p>
+        </p:txBody>
+      </p:sp>
+      <p:sp>
+        <p:nvSpPr>
+          <p:cNvPr id="3" name="Content Placeholder 2">
+            <a:extLst>
+              <a:ext uri="{FF2B5EF4-FFF2-40B4-BE49-F238E27FC236}">
+                <a16:creationId xmlns:a16="http://schemas.microsoft.com/office/drawing/2014/main" id="{5FBBB0AF-80B2-4840-8B0B-E0286BBC40A0}"/>
+              </a:ext>
+            </a:extLst>
+          </p:cNvPr>
+          <p:cNvSpPr>
+            <a:spLocks noGrp="1"/>
+          </p:cNvSpPr>
+          <p:nvPr>
+            <p:ph idx="1"/>
+          </p:nvPr>
+        </p:nvSpPr>
+        <p:spPr>
+          <a:xfrm>
+            <a:off x="481264" y="1540042"/>
+            <a:ext cx="10709476" cy="4708357"/>
+          </a:xfrm>
+        </p:spPr>
+        <p:txBody>
+          <a:bodyPr>
+            <a:normAutofit fontScale="92500" lnSpcReduction="20000"/>
+          </a:bodyPr>
+          <a:lstStyle/>
+          <a:p>
+            <a:r>
+              <a:rPr lang="en-US" dirty="0"/>
+              <a:t>Expand the Trade Study</a:t>
+            </a:r>
+          </a:p>
+          <a:p>
+            <a:pPr lvl="1"/>
+            <a:r>
+              <a:rPr lang="en-US" dirty="0"/>
+              <a:t>Metal Configurations / Co-Lo (rent-a-box)</a:t>
+            </a:r>
+          </a:p>
+          <a:p>
+            <a:pPr lvl="1"/>
+            <a:r>
+              <a:rPr lang="en-US" dirty="0"/>
+              <a:t>Private Clouds </a:t>
+            </a:r>
+          </a:p>
+          <a:p>
+            <a:pPr lvl="2"/>
+            <a:r>
+              <a:rPr lang="en-US" dirty="0"/>
+              <a:t>Nutanix, DC/OS on Metal, Tectonic/OpenShift on Metal</a:t>
+            </a:r>
+          </a:p>
+          <a:p>
+            <a:pPr lvl="2"/>
+            <a:r>
+              <a:rPr lang="en-US" dirty="0"/>
+              <a:t>Various SDS solutions (</a:t>
+            </a:r>
+            <a:r>
+              <a:rPr lang="en-US" dirty="0" err="1"/>
+              <a:t>OpenEBS</a:t>
+            </a:r>
+            <a:r>
+              <a:rPr lang="en-US" dirty="0"/>
+              <a:t>, </a:t>
+            </a:r>
+            <a:r>
+              <a:rPr lang="en-US" dirty="0" err="1"/>
+              <a:t>Portworx</a:t>
+            </a:r>
+            <a:r>
+              <a:rPr lang="en-US" dirty="0"/>
+              <a:t>, Rook, </a:t>
+            </a:r>
+            <a:r>
+              <a:rPr lang="en-US" dirty="0" err="1"/>
+              <a:t>ScaleIO</a:t>
+            </a:r>
+            <a:r>
+              <a:rPr lang="en-US" dirty="0"/>
+              <a:t>, etc.)</a:t>
+            </a:r>
+          </a:p>
+          <a:p>
+            <a:pPr lvl="1"/>
+            <a:r>
+              <a:rPr lang="en-US" dirty="0"/>
+              <a:t>Public Clouds</a:t>
+            </a:r>
+          </a:p>
+          <a:p>
+            <a:pPr lvl="2"/>
+            <a:r>
+              <a:rPr lang="en-US" dirty="0"/>
+              <a:t>Azure, Rackspace, Digital Ocean, Google Cloud</a:t>
+            </a:r>
+          </a:p>
+          <a:p>
+            <a:r>
+              <a:rPr lang="en-US" dirty="0"/>
+              <a:t>Refine the approach</a:t>
+            </a:r>
+          </a:p>
+          <a:p>
+            <a:pPr lvl="1"/>
+            <a:r>
+              <a:rPr lang="en-US" dirty="0"/>
+              <a:t>Optimization </a:t>
+            </a:r>
+          </a:p>
+          <a:p>
+            <a:pPr lvl="2"/>
+            <a:r>
+              <a:rPr lang="en-US" dirty="0"/>
+              <a:t>Anyone want to help tune PG in docker for each AWS EC2 instance type/disk setup?</a:t>
+            </a:r>
+          </a:p>
+          <a:p>
+            <a:pPr lvl="1"/>
+            <a:r>
+              <a:rPr lang="en-US" dirty="0"/>
+              <a:t>Additional considerations </a:t>
+            </a:r>
+          </a:p>
+          <a:p>
+            <a:pPr lvl="2"/>
+            <a:r>
+              <a:rPr lang="en-US" dirty="0"/>
+              <a:t>Technical </a:t>
+            </a:r>
+          </a:p>
+          <a:p>
+            <a:pPr lvl="2"/>
+            <a:r>
+              <a:rPr lang="en-US" dirty="0"/>
+              <a:t>Cost</a:t>
+            </a:r>
+          </a:p>
+          <a:p>
+            <a:r>
+              <a:rPr lang="en-US" dirty="0"/>
+              <a:t>Focus is still on TCO for a given set of requirements ($/month/TPS)</a:t>
+            </a:r>
+          </a:p>
+          <a:p>
+            <a:pPr lvl="1"/>
+            <a:endParaRPr lang="en-US" dirty="0"/>
+          </a:p>
+        </p:txBody>
+      </p:sp>
+      <p:sp>
+        <p:nvSpPr>
+          <p:cNvPr id="4" name="Date Placeholder 3">
+            <a:extLst>
+              <a:ext uri="{FF2B5EF4-FFF2-40B4-BE49-F238E27FC236}">
+                <a16:creationId xmlns:a16="http://schemas.microsoft.com/office/drawing/2014/main" id="{34C5C411-6C99-DB42-83D1-D4940A289A80}"/>
+              </a:ext>
+            </a:extLst>
+          </p:cNvPr>
+          <p:cNvSpPr>
+            <a:spLocks noGrp="1"/>
+          </p:cNvSpPr>
+          <p:nvPr>
+            <p:ph type="dt" sz="half" idx="10"/>
+          </p:nvPr>
+        </p:nvSpPr>
+        <p:spPr/>
+        <p:txBody>
+          <a:bodyPr/>
+          <a:lstStyle/>
+          <a:p>
+            <a:r>
+              <a:rPr lang="en-US"/>
+              <a:t>3/21/2019</a:t>
+            </a:r>
+            <a:endParaRPr lang="en-US" dirty="0"/>
+          </a:p>
+        </p:txBody>
+      </p:sp>
+      <p:sp>
+        <p:nvSpPr>
+          <p:cNvPr id="5" name="Footer Placeholder 4">
+            <a:extLst>
+              <a:ext uri="{FF2B5EF4-FFF2-40B4-BE49-F238E27FC236}">
+                <a16:creationId xmlns:a16="http://schemas.microsoft.com/office/drawing/2014/main" id="{D5ACC473-C101-0149-B922-3C33BFA34BE8}"/>
+              </a:ext>
+            </a:extLst>
+          </p:cNvPr>
+          <p:cNvSpPr>
+            <a:spLocks noGrp="1"/>
+          </p:cNvSpPr>
+          <p:nvPr>
+            <p:ph type="ftr" sz="quarter" idx="11"/>
+          </p:nvPr>
+        </p:nvSpPr>
+        <p:spPr/>
+        <p:txBody>
+          <a:bodyPr/>
+          <a:lstStyle/>
+          <a:p>
+            <a:r>
+              <a:rPr lang="en-US"/>
+              <a:t>Copyright © 2019 by Jeffrey Zampieron All rights reserved.</a:t>
+            </a:r>
+            <a:endParaRPr lang="en-US" dirty="0"/>
+          </a:p>
+        </p:txBody>
+      </p:sp>
+      <p:sp>
+        <p:nvSpPr>
+          <p:cNvPr id="6" name="Slide Number Placeholder 5">
+            <a:extLst>
+              <a:ext uri="{FF2B5EF4-FFF2-40B4-BE49-F238E27FC236}">
+                <a16:creationId xmlns:a16="http://schemas.microsoft.com/office/drawing/2014/main" id="{B4D98C5B-150D-9F47-9793-48AA62F4D36C}"/>
+              </a:ext>
+            </a:extLst>
+          </p:cNvPr>
+          <p:cNvSpPr>
+            <a:spLocks noGrp="1"/>
+          </p:cNvSpPr>
+          <p:nvPr>
+            <p:ph type="sldNum" sz="quarter" idx="12"/>
+          </p:nvPr>
+        </p:nvSpPr>
+        <p:spPr/>
+        <p:txBody>
+          <a:bodyPr/>
+          <a:lstStyle/>
+          <a:p>
+            <a:fld id="{D57F1E4F-1CFF-5643-939E-02111984F565}" type="slidenum">
+              <a:rPr lang="en-US" smtClean="0"/>
+              <a:t>22</a:t>
+            </a:fld>
+            <a:endParaRPr lang="en-US" dirty="0"/>
+          </a:p>
+        </p:txBody>
+      </p:sp>
+    </p:spTree>
+    <p:extLst>
+      <p:ext uri="{BB962C8B-B14F-4D97-AF65-F5344CB8AC3E}">
+        <p14:creationId xmlns:p14="http://schemas.microsoft.com/office/powerpoint/2010/main" val="4220377167"/>
+      </p:ext>
+    </p:extLst>
+  </p:cSld>
+  <p:clrMapOvr>
+    <a:masterClrMapping/>
+  </p:clrMapOvr>
+</p:sld>
+</file>
+
+<file path=ppt/slides/slide23.xml><?xml version="1.0" encoding="utf-8"?>
+<p:sld xmlns:a="http://schemas.openxmlformats.org/drawingml/2006/main" xmlns:r="http://schemas.openxmlformats.org/officeDocument/2006/relationships" xmlns:p="http://schemas.openxmlformats.org/presentationml/2006/main">
+  <p:cSld>
+    <p:spTree>
+      <p:nvGrpSpPr>
+        <p:cNvPr id="1" name=""/>
+        <p:cNvGrpSpPr/>
+        <p:nvPr/>
+      </p:nvGrpSpPr>
+      <p:grpSpPr>
+        <a:xfrm>
+          <a:off x="0" y="0"/>
+          <a:ext cx="0" cy="0"/>
+          <a:chOff x="0" y="0"/>
+          <a:chExt cx="0" cy="0"/>
+        </a:xfrm>
+      </p:grpSpPr>
+      <p:sp>
+        <p:nvSpPr>
+          <p:cNvPr id="2" name="Title 1">
+            <a:extLst>
+              <a:ext uri="{FF2B5EF4-FFF2-40B4-BE49-F238E27FC236}">
+                <a16:creationId xmlns:a16="http://schemas.microsoft.com/office/drawing/2014/main" id="{2E2DBCA9-7095-994C-9DA1-C2EC9243CCC4}"/>
+              </a:ext>
+            </a:extLst>
+          </p:cNvPr>
+          <p:cNvSpPr>
+            <a:spLocks noGrp="1"/>
+          </p:cNvSpPr>
+          <p:nvPr>
+            <p:ph type="title"/>
+          </p:nvPr>
+        </p:nvSpPr>
+        <p:spPr/>
+        <p:txBody>
+          <a:bodyPr/>
+          <a:lstStyle/>
+          <a:p>
+            <a:r>
+              <a:rPr lang="en-US" dirty="0"/>
+              <a:t>Enhancement Opportunities</a:t>
+            </a:r>
+          </a:p>
+        </p:txBody>
+      </p:sp>
+      <p:sp>
+        <p:nvSpPr>
+          <p:cNvPr id="3" name="Content Placeholder 2">
+            <a:extLst>
+              <a:ext uri="{FF2B5EF4-FFF2-40B4-BE49-F238E27FC236}">
+                <a16:creationId xmlns:a16="http://schemas.microsoft.com/office/drawing/2014/main" id="{BA3D8B59-6B8E-2342-B2FB-16A713EAEE01}"/>
+              </a:ext>
+            </a:extLst>
+          </p:cNvPr>
+          <p:cNvSpPr>
+            <a:spLocks noGrp="1"/>
+          </p:cNvSpPr>
+          <p:nvPr>
+            <p:ph idx="1"/>
+          </p:nvPr>
+        </p:nvSpPr>
+        <p:spPr>
+          <a:xfrm>
+            <a:off x="818148" y="1323474"/>
+            <a:ext cx="9962148" cy="5081808"/>
+          </a:xfrm>
+        </p:spPr>
+        <p:txBody>
+          <a:bodyPr>
+            <a:normAutofit/>
+          </a:bodyPr>
+          <a:lstStyle/>
+          <a:p>
+            <a:r>
+              <a:rPr lang="en-US" dirty="0"/>
+              <a:t>These are some ideas to make PG even better</a:t>
+            </a:r>
+          </a:p>
+          <a:p>
+            <a:r>
+              <a:rPr lang="en-US" dirty="0"/>
+              <a:t>DevOps Enhancements</a:t>
+            </a:r>
+          </a:p>
+          <a:p>
+            <a:pPr lvl="1"/>
+            <a:r>
+              <a:rPr lang="en-US" dirty="0"/>
+              <a:t>Quiesce for filesystems with Atomic </a:t>
+            </a:r>
+            <a:r>
+              <a:rPr lang="en-US" dirty="0" err="1"/>
+              <a:t>CoW</a:t>
+            </a:r>
+            <a:r>
+              <a:rPr lang="en-US" dirty="0"/>
+              <a:t> snapshots </a:t>
+            </a:r>
+          </a:p>
+          <a:p>
+            <a:pPr lvl="2"/>
+            <a:r>
+              <a:rPr lang="en-US" dirty="0"/>
+              <a:t>Matters more for split Data / WAL</a:t>
+            </a:r>
+          </a:p>
+          <a:p>
+            <a:pPr lvl="2"/>
+            <a:r>
+              <a:rPr lang="en-US" dirty="0"/>
+              <a:t>Some SDS vendors support this (</a:t>
+            </a:r>
+            <a:r>
+              <a:rPr lang="en-US" dirty="0" err="1"/>
+              <a:t>Portworx</a:t>
+            </a:r>
+            <a:r>
+              <a:rPr lang="en-US" dirty="0"/>
+              <a:t>)</a:t>
+            </a:r>
+          </a:p>
+          <a:p>
+            <a:pPr lvl="2"/>
+            <a:r>
+              <a:rPr lang="en-US" dirty="0"/>
+              <a:t>Something like a CHECKPOINT_AND_PAUSE</a:t>
+            </a:r>
+          </a:p>
+          <a:p>
+            <a:pPr lvl="1"/>
+            <a:r>
+              <a:rPr lang="en-US" dirty="0"/>
+              <a:t>Consistent Backup to Blob Storage</a:t>
+            </a:r>
+          </a:p>
+          <a:p>
+            <a:pPr lvl="2"/>
+            <a:r>
+              <a:rPr lang="en-US" dirty="0"/>
+              <a:t>Maybe a </a:t>
+            </a:r>
+            <a:r>
+              <a:rPr lang="en-US" dirty="0" err="1"/>
+              <a:t>pg_cloud_dump</a:t>
+            </a:r>
+            <a:endParaRPr lang="en-US" dirty="0"/>
+          </a:p>
+          <a:p>
+            <a:pPr lvl="2"/>
+            <a:r>
+              <a:rPr lang="en-US" dirty="0"/>
+              <a:t>Loadable module</a:t>
+            </a:r>
+          </a:p>
+          <a:p>
+            <a:pPr lvl="1"/>
+            <a:r>
+              <a:rPr lang="en-US" dirty="0"/>
+              <a:t>Data FEC instead of data checksums</a:t>
+            </a:r>
+          </a:p>
+          <a:p>
+            <a:pPr lvl="2"/>
+            <a:r>
+              <a:rPr lang="en-US" dirty="0"/>
+              <a:t>Are data checksums really useful if you can’t recover</a:t>
+            </a:r>
+          </a:p>
+        </p:txBody>
+      </p:sp>
+      <p:sp>
+        <p:nvSpPr>
+          <p:cNvPr id="4" name="Date Placeholder 3">
+            <a:extLst>
+              <a:ext uri="{FF2B5EF4-FFF2-40B4-BE49-F238E27FC236}">
+                <a16:creationId xmlns:a16="http://schemas.microsoft.com/office/drawing/2014/main" id="{C51A8303-63CF-8A42-8B69-3336B0A65DB9}"/>
+              </a:ext>
+            </a:extLst>
+          </p:cNvPr>
+          <p:cNvSpPr>
+            <a:spLocks noGrp="1"/>
+          </p:cNvSpPr>
+          <p:nvPr>
+            <p:ph type="dt" sz="half" idx="10"/>
+          </p:nvPr>
+        </p:nvSpPr>
+        <p:spPr/>
+        <p:txBody>
+          <a:bodyPr/>
+          <a:lstStyle/>
+          <a:p>
+            <a:r>
+              <a:rPr lang="en-US"/>
+              <a:t>3/21/2019</a:t>
+            </a:r>
+            <a:endParaRPr lang="en-US" dirty="0"/>
+          </a:p>
+        </p:txBody>
+      </p:sp>
+      <p:sp>
+        <p:nvSpPr>
+          <p:cNvPr id="5" name="Footer Placeholder 4">
+            <a:extLst>
+              <a:ext uri="{FF2B5EF4-FFF2-40B4-BE49-F238E27FC236}">
+                <a16:creationId xmlns:a16="http://schemas.microsoft.com/office/drawing/2014/main" id="{A7347C54-A1FF-AA48-A3F0-93F4B97048E6}"/>
+              </a:ext>
+            </a:extLst>
+          </p:cNvPr>
+          <p:cNvSpPr>
+            <a:spLocks noGrp="1"/>
+          </p:cNvSpPr>
+          <p:nvPr>
+            <p:ph type="ftr" sz="quarter" idx="11"/>
+          </p:nvPr>
+        </p:nvSpPr>
+        <p:spPr/>
+        <p:txBody>
+          <a:bodyPr/>
+          <a:lstStyle/>
+          <a:p>
+            <a:r>
+              <a:rPr lang="en-US"/>
+              <a:t>Copyright © 2019 by Jeffrey Zampieron All rights reserved.</a:t>
+            </a:r>
+            <a:endParaRPr lang="en-US" dirty="0"/>
+          </a:p>
+        </p:txBody>
+      </p:sp>
+      <p:sp>
+        <p:nvSpPr>
+          <p:cNvPr id="6" name="Slide Number Placeholder 5">
+            <a:extLst>
+              <a:ext uri="{FF2B5EF4-FFF2-40B4-BE49-F238E27FC236}">
+                <a16:creationId xmlns:a16="http://schemas.microsoft.com/office/drawing/2014/main" id="{53692AD8-3AAD-3646-9B10-2CF80A87966B}"/>
+              </a:ext>
+            </a:extLst>
+          </p:cNvPr>
+          <p:cNvSpPr>
+            <a:spLocks noGrp="1"/>
+          </p:cNvSpPr>
+          <p:nvPr>
+            <p:ph type="sldNum" sz="quarter" idx="12"/>
+          </p:nvPr>
+        </p:nvSpPr>
+        <p:spPr/>
+        <p:txBody>
+          <a:bodyPr/>
+          <a:lstStyle/>
+          <a:p>
+            <a:fld id="{D57F1E4F-1CFF-5643-939E-02111984F565}" type="slidenum">
+              <a:rPr lang="en-US" smtClean="0"/>
+              <a:t>23</a:t>
+            </a:fld>
+            <a:endParaRPr lang="en-US" dirty="0"/>
+          </a:p>
+        </p:txBody>
+      </p:sp>
+    </p:spTree>
+    <p:extLst>
+      <p:ext uri="{BB962C8B-B14F-4D97-AF65-F5344CB8AC3E}">
+        <p14:creationId xmlns:p14="http://schemas.microsoft.com/office/powerpoint/2010/main" val="148156189"/>
+      </p:ext>
+    </p:extLst>
+  </p:cSld>
+  <p:clrMapOvr>
+    <a:masterClrMapping/>
+  </p:clrMapOvr>
+</p:sld>
+</file>
+
+<file path=ppt/slides/slide24.xml><?xml version="1.0" encoding="utf-8"?>
+<p:sld xmlns:a="http://schemas.openxmlformats.org/drawingml/2006/main" xmlns:r="http://schemas.openxmlformats.org/officeDocument/2006/relationships" xmlns:p="http://schemas.openxmlformats.org/presentationml/2006/main">
+  <p:cSld>
+    <p:spTree>
+      <p:nvGrpSpPr>
+        <p:cNvPr id="1" name=""/>
+        <p:cNvGrpSpPr/>
+        <p:nvPr/>
+      </p:nvGrpSpPr>
+      <p:grpSpPr>
+        <a:xfrm>
+          <a:off x="0" y="0"/>
+          <a:ext cx="0" cy="0"/>
+          <a:chOff x="0" y="0"/>
+          <a:chExt cx="0" cy="0"/>
+        </a:xfrm>
+      </p:grpSpPr>
+      <p:sp>
+        <p:nvSpPr>
+          <p:cNvPr id="2" name="Title 1">
+            <a:extLst>
+              <a:ext uri="{FF2B5EF4-FFF2-40B4-BE49-F238E27FC236}">
+                <a16:creationId xmlns:a16="http://schemas.microsoft.com/office/drawing/2014/main" id="{A5EA4341-702A-D549-926E-30E0724A4347}"/>
+              </a:ext>
+            </a:extLst>
+          </p:cNvPr>
+          <p:cNvSpPr>
+            <a:spLocks noGrp="1"/>
+          </p:cNvSpPr>
+          <p:nvPr>
+            <p:ph type="title"/>
+          </p:nvPr>
+        </p:nvSpPr>
+        <p:spPr/>
+        <p:txBody>
+          <a:bodyPr/>
+          <a:lstStyle/>
+          <a:p>
+            <a:r>
+              <a:rPr lang="en-US" dirty="0"/>
+              <a:t>Questions and Discussion</a:t>
+            </a:r>
+          </a:p>
+        </p:txBody>
+      </p:sp>
+      <p:sp>
+        <p:nvSpPr>
+          <p:cNvPr id="4" name="Date Placeholder 3">
+            <a:extLst>
+              <a:ext uri="{FF2B5EF4-FFF2-40B4-BE49-F238E27FC236}">
+                <a16:creationId xmlns:a16="http://schemas.microsoft.com/office/drawing/2014/main" id="{FA3B3CC7-AFD1-624B-B1C5-C1C9D0F71189}"/>
+              </a:ext>
+            </a:extLst>
+          </p:cNvPr>
+          <p:cNvSpPr>
+            <a:spLocks noGrp="1"/>
+          </p:cNvSpPr>
+          <p:nvPr>
+            <p:ph type="dt" sz="half" idx="10"/>
+          </p:nvPr>
+        </p:nvSpPr>
+        <p:spPr/>
+        <p:txBody>
+          <a:bodyPr/>
+          <a:lstStyle/>
+          <a:p>
+            <a:r>
+              <a:rPr lang="en-US"/>
+              <a:t>3/21/2019</a:t>
+            </a:r>
+            <a:endParaRPr lang="en-US" dirty="0"/>
+          </a:p>
+        </p:txBody>
+      </p:sp>
+      <p:sp>
+        <p:nvSpPr>
+          <p:cNvPr id="5" name="Footer Placeholder 4">
+            <a:extLst>
+              <a:ext uri="{FF2B5EF4-FFF2-40B4-BE49-F238E27FC236}">
+                <a16:creationId xmlns:a16="http://schemas.microsoft.com/office/drawing/2014/main" id="{720483F0-B644-D24A-8F70-B0D10CEAA84B}"/>
+              </a:ext>
+            </a:extLst>
+          </p:cNvPr>
+          <p:cNvSpPr>
+            <a:spLocks noGrp="1"/>
+          </p:cNvSpPr>
+          <p:nvPr>
+            <p:ph type="ftr" sz="quarter" idx="11"/>
+          </p:nvPr>
+        </p:nvSpPr>
+        <p:spPr/>
+        <p:txBody>
+          <a:bodyPr/>
+          <a:lstStyle/>
+          <a:p>
+            <a:r>
+              <a:rPr lang="en-US"/>
+              <a:t>Copyright © 2019 by Jeffrey Zampieron All rights reserved.</a:t>
+            </a:r>
+            <a:endParaRPr lang="en-US" dirty="0"/>
+          </a:p>
+        </p:txBody>
+      </p:sp>
+      <p:sp>
+        <p:nvSpPr>
+          <p:cNvPr id="6" name="Slide Number Placeholder 5">
+            <a:extLst>
+              <a:ext uri="{FF2B5EF4-FFF2-40B4-BE49-F238E27FC236}">
+                <a16:creationId xmlns:a16="http://schemas.microsoft.com/office/drawing/2014/main" id="{74FCB0E1-8677-4E41-8772-813EA637639C}"/>
+              </a:ext>
+            </a:extLst>
+          </p:cNvPr>
+          <p:cNvSpPr>
+            <a:spLocks noGrp="1"/>
+          </p:cNvSpPr>
+          <p:nvPr>
+            <p:ph type="sldNum" sz="quarter" idx="12"/>
+          </p:nvPr>
+        </p:nvSpPr>
+        <p:spPr/>
+        <p:txBody>
+          <a:bodyPr/>
+          <a:lstStyle/>
+          <a:p>
+            <a:fld id="{D57F1E4F-1CFF-5643-939E-02111984F565}" type="slidenum">
+              <a:rPr lang="en-US" smtClean="0"/>
+              <a:t>24</a:t>
+            </a:fld>
+            <a:endParaRPr lang="en-US" dirty="0"/>
+          </a:p>
+        </p:txBody>
+      </p:sp>
+      <p:sp>
+        <p:nvSpPr>
+          <p:cNvPr id="7" name="TextBox 6">
+            <a:extLst>
+              <a:ext uri="{FF2B5EF4-FFF2-40B4-BE49-F238E27FC236}">
+                <a16:creationId xmlns:a16="http://schemas.microsoft.com/office/drawing/2014/main" id="{657920D1-C804-994A-B98D-F26E693CB374}"/>
+              </a:ext>
+            </a:extLst>
+          </p:cNvPr>
+          <p:cNvSpPr txBox="1"/>
+          <p:nvPr/>
+        </p:nvSpPr>
+        <p:spPr>
+          <a:xfrm>
+            <a:off x="1746584" y="2979366"/>
+            <a:ext cx="8698831" cy="1754326"/>
+          </a:xfrm>
+          <a:prstGeom prst="rect">
+            <a:avLst/>
+          </a:prstGeom>
+          <a:noFill/>
+        </p:spPr>
+        <p:txBody>
+          <a:bodyPr wrap="square" rtlCol="0">
+            <a:spAutoFit/>
+          </a:bodyPr>
+          <a:lstStyle/>
+          <a:p>
+            <a:pPr algn="ctr"/>
+            <a:r>
+              <a:rPr lang="en-US" sz="3600" dirty="0"/>
+              <a:t>Thanks for your attention.</a:t>
+            </a:r>
+          </a:p>
+          <a:p>
+            <a:endParaRPr lang="en-US" sz="3600" dirty="0"/>
+          </a:p>
+          <a:p>
+            <a:pPr algn="ctr"/>
+            <a:r>
+              <a:rPr lang="en-US" sz="3600" dirty="0"/>
+              <a:t>Questions? </a:t>
+            </a:r>
+          </a:p>
+        </p:txBody>
+      </p:sp>
+      <p:sp>
+        <p:nvSpPr>
+          <p:cNvPr id="3" name="TextBox 2">
+            <a:extLst>
+              <a:ext uri="{FF2B5EF4-FFF2-40B4-BE49-F238E27FC236}">
+                <a16:creationId xmlns:a16="http://schemas.microsoft.com/office/drawing/2014/main" id="{B9551905-59AC-3F44-8661-1ADB909EC4BD}"/>
+              </a:ext>
+            </a:extLst>
+          </p:cNvPr>
+          <p:cNvSpPr txBox="1"/>
+          <p:nvPr/>
+        </p:nvSpPr>
+        <p:spPr>
+          <a:xfrm>
+            <a:off x="914400" y="4944981"/>
+            <a:ext cx="10539663" cy="923330"/>
+          </a:xfrm>
+          <a:prstGeom prst="rect">
+            <a:avLst/>
+          </a:prstGeom>
+          <a:noFill/>
+        </p:spPr>
+        <p:txBody>
+          <a:bodyPr wrap="square" rtlCol="0">
+            <a:spAutoFit/>
+          </a:bodyPr>
+          <a:lstStyle/>
+          <a:p>
+            <a:r>
+              <a:rPr lang="en-US" dirty="0"/>
+              <a:t>Presentation, Code and Raw Test Data at:</a:t>
+            </a:r>
+          </a:p>
+          <a:p>
+            <a:r>
+              <a:rPr lang="en-US" dirty="0">
+                <a:hlinkClick r:id="rId2"/>
+              </a:rPr>
+              <a:t>https://github.com/jzampieron/pgconf2019/tree/master</a:t>
+            </a:r>
+            <a:endParaRPr lang="en-US" dirty="0"/>
+          </a:p>
+          <a:p>
+            <a:endParaRPr lang="en-US" dirty="0"/>
+          </a:p>
+        </p:txBody>
+      </p:sp>
+    </p:spTree>
+    <p:extLst>
+      <p:ext uri="{BB962C8B-B14F-4D97-AF65-F5344CB8AC3E}">
+        <p14:creationId xmlns:p14="http://schemas.microsoft.com/office/powerpoint/2010/main" val="1501694016"/>
+      </p:ext>
+    </p:extLst>
+  </p:cSld>
+  <p:clrMapOvr>
+    <a:masterClrMapping/>
+  </p:clrMapOvr>
+</p:sld>
+</file>
+
+<file path=ppt/slides/slide25.xml><?xml version="1.0" encoding="utf-8"?>
+<p:sld xmlns:a="http://schemas.openxmlformats.org/drawingml/2006/main" xmlns:r="http://schemas.openxmlformats.org/officeDocument/2006/relationships" xmlns:p="http://schemas.openxmlformats.org/presentationml/2006/main">
+  <p:cSld>
+    <p:spTree>
+      <p:nvGrpSpPr>
+        <p:cNvPr id="1" name=""/>
+        <p:cNvGrpSpPr/>
+        <p:nvPr/>
+      </p:nvGrpSpPr>
+      <p:grpSpPr>
+        <a:xfrm>
+          <a:off x="0" y="0"/>
+          <a:ext cx="0" cy="0"/>
+          <a:chOff x="0" y="0"/>
+          <a:chExt cx="0" cy="0"/>
+        </a:xfrm>
+      </p:grpSpPr>
+      <p:sp>
+        <p:nvSpPr>
+          <p:cNvPr id="2" name="Title 1">
+            <a:extLst>
+              <a:ext uri="{FF2B5EF4-FFF2-40B4-BE49-F238E27FC236}">
+                <a16:creationId xmlns:a16="http://schemas.microsoft.com/office/drawing/2014/main" id="{C4AEB51F-C0C4-3840-BF5B-F7206A592C55}"/>
+              </a:ext>
+            </a:extLst>
+          </p:cNvPr>
+          <p:cNvSpPr>
+            <a:spLocks noGrp="1"/>
+          </p:cNvSpPr>
+          <p:nvPr>
+            <p:ph type="title"/>
+          </p:nvPr>
+        </p:nvSpPr>
+        <p:spPr/>
+        <p:txBody>
+          <a:bodyPr/>
+          <a:lstStyle/>
+          <a:p>
+            <a:r>
+              <a:rPr lang="en-US" dirty="0"/>
+              <a:t>Extra Material</a:t>
+            </a:r>
+          </a:p>
+        </p:txBody>
+      </p:sp>
+      <p:sp>
+        <p:nvSpPr>
+          <p:cNvPr id="3" name="Content Placeholder 2">
+            <a:extLst>
+              <a:ext uri="{FF2B5EF4-FFF2-40B4-BE49-F238E27FC236}">
+                <a16:creationId xmlns:a16="http://schemas.microsoft.com/office/drawing/2014/main" id="{3093E383-6C78-5A47-B338-F8C7C1DC351C}"/>
+              </a:ext>
+            </a:extLst>
+          </p:cNvPr>
+          <p:cNvSpPr>
+            <a:spLocks noGrp="1"/>
+          </p:cNvSpPr>
+          <p:nvPr>
+            <p:ph idx="1"/>
+          </p:nvPr>
+        </p:nvSpPr>
+        <p:spPr/>
+        <p:txBody>
+          <a:bodyPr/>
+          <a:lstStyle/>
+          <a:p>
+            <a:endParaRPr lang="en-US"/>
+          </a:p>
+        </p:txBody>
+      </p:sp>
+      <p:sp>
+        <p:nvSpPr>
+          <p:cNvPr id="4" name="Date Placeholder 3">
+            <a:extLst>
+              <a:ext uri="{FF2B5EF4-FFF2-40B4-BE49-F238E27FC236}">
+                <a16:creationId xmlns:a16="http://schemas.microsoft.com/office/drawing/2014/main" id="{CF39E177-F106-414A-BF42-51601A356750}"/>
+              </a:ext>
+            </a:extLst>
+          </p:cNvPr>
+          <p:cNvSpPr>
+            <a:spLocks noGrp="1"/>
+          </p:cNvSpPr>
+          <p:nvPr>
+            <p:ph type="dt" sz="half" idx="10"/>
+          </p:nvPr>
+        </p:nvSpPr>
+        <p:spPr/>
+        <p:txBody>
+          <a:bodyPr/>
+          <a:lstStyle/>
+          <a:p>
+            <a:r>
+              <a:rPr lang="en-US"/>
+              <a:t>3/21/2019</a:t>
+            </a:r>
+            <a:endParaRPr lang="en-US" dirty="0"/>
+          </a:p>
+        </p:txBody>
+      </p:sp>
+      <p:sp>
+        <p:nvSpPr>
+          <p:cNvPr id="5" name="Footer Placeholder 4">
+            <a:extLst>
+              <a:ext uri="{FF2B5EF4-FFF2-40B4-BE49-F238E27FC236}">
+                <a16:creationId xmlns:a16="http://schemas.microsoft.com/office/drawing/2014/main" id="{7C564C07-03AC-D94B-905F-B821368A9179}"/>
+              </a:ext>
+            </a:extLst>
+          </p:cNvPr>
+          <p:cNvSpPr>
+            <a:spLocks noGrp="1"/>
+          </p:cNvSpPr>
+          <p:nvPr>
+            <p:ph type="ftr" sz="quarter" idx="11"/>
+          </p:nvPr>
+        </p:nvSpPr>
+        <p:spPr/>
+        <p:txBody>
+          <a:bodyPr/>
+          <a:lstStyle/>
+          <a:p>
+            <a:r>
+              <a:rPr lang="en-US"/>
+              <a:t>Copyright © 2019 by Jeffrey Zampieron All rights reserved.</a:t>
+            </a:r>
+            <a:endParaRPr lang="en-US" dirty="0"/>
+          </a:p>
+        </p:txBody>
+      </p:sp>
+      <p:sp>
+        <p:nvSpPr>
+          <p:cNvPr id="6" name="Slide Number Placeholder 5">
+            <a:extLst>
+              <a:ext uri="{FF2B5EF4-FFF2-40B4-BE49-F238E27FC236}">
+                <a16:creationId xmlns:a16="http://schemas.microsoft.com/office/drawing/2014/main" id="{CFFBE9A3-F261-5A43-AA43-EC549C6E58B8}"/>
+              </a:ext>
+            </a:extLst>
+          </p:cNvPr>
+          <p:cNvSpPr>
+            <a:spLocks noGrp="1"/>
+          </p:cNvSpPr>
+          <p:nvPr>
+            <p:ph type="sldNum" sz="quarter" idx="12"/>
+          </p:nvPr>
+        </p:nvSpPr>
+        <p:spPr/>
+        <p:txBody>
+          <a:bodyPr/>
+          <a:lstStyle/>
+          <a:p>
+            <a:fld id="{D57F1E4F-1CFF-5643-939E-02111984F565}" type="slidenum">
+              <a:rPr lang="en-US" smtClean="0"/>
+              <a:t>25</a:t>
+            </a:fld>
+            <a:endParaRPr lang="en-US" dirty="0"/>
+          </a:p>
+        </p:txBody>
+      </p:sp>
+    </p:spTree>
+    <p:extLst>
+      <p:ext uri="{BB962C8B-B14F-4D97-AF65-F5344CB8AC3E}">
+        <p14:creationId xmlns:p14="http://schemas.microsoft.com/office/powerpoint/2010/main" val="1008189970"/>
+      </p:ext>
+    </p:extLst>
+  </p:cSld>
+  <p:clrMapOvr>
+    <a:masterClrMapping/>
+  </p:clrMapOvr>
+</p:sld>
+</file>
+
+<file path=ppt/slides/slide26.xml><?xml version="1.0" encoding="utf-8"?>
+<p:sld xmlns:a="http://schemas.openxmlformats.org/drawingml/2006/main" xmlns:r="http://schemas.openxmlformats.org/officeDocument/2006/relationships" xmlns:p="http://schemas.openxmlformats.org/presentationml/2006/main">
+  <p:cSld>
+    <p:spTree>
+      <p:nvGrpSpPr>
+        <p:cNvPr id="1" name=""/>
+        <p:cNvGrpSpPr/>
+        <p:nvPr/>
+      </p:nvGrpSpPr>
+      <p:grpSpPr>
+        <a:xfrm>
+          <a:off x="0" y="0"/>
+          <a:ext cx="0" cy="0"/>
+          <a:chOff x="0" y="0"/>
+          <a:chExt cx="0" cy="0"/>
+        </a:xfrm>
+      </p:grpSpPr>
+      <p:sp>
+        <p:nvSpPr>
+          <p:cNvPr id="2" name="Title 1">
+            <a:extLst>
+              <a:ext uri="{FF2B5EF4-FFF2-40B4-BE49-F238E27FC236}">
                 <a16:creationId xmlns:a16="http://schemas.microsoft.com/office/drawing/2014/main" id="{6A50111F-7C98-6D44-8028-1680899CDA77}"/>
               </a:ext>
             </a:extLst>
@@ -10116,7 +11643,7 @@
           <a:p>
             <a:fld id="{D57F1E4F-1CFF-5643-939E-02111984F565}" type="slidenum">
               <a:rPr lang="en-US" smtClean="0"/>
-              <a:t>21</a:t>
+              <a:t>26</a:t>
             </a:fld>
             <a:endParaRPr lang="en-US" dirty="0"/>
           </a:p>
@@ -10977,7 +12504,7 @@
             <a:pPr lvl="1"/>
             <a:r>
               <a:rPr lang="en-US" dirty="0"/>
-              <a:t>First though is usually… what did I do wrong?</a:t>
+              <a:t>First thought is usually… what did I do wrong?</a:t>
             </a:r>
           </a:p>
           <a:p>

</xml_diff>